<commit_message>
added animations and updated times for afternoon
</commit_message>
<xml_diff>
--- a/slides.pptx
+++ b/slides.pptx
@@ -1516,31 +1516,6 @@
     </pc:docChg>
   </pc:docChgLst>
   <pc:docChgLst>
-    <pc:chgData name="Emilio Lehoucq" userId="S::elm8295@ads.northwestern.edu::fb1e86bc-2dff-49e3-9a0f-9c63245e88ac" providerId="AD" clId="Web-{B997FA96-47F4-F522-4B08-B6D6BAA276C3}"/>
-    <pc:docChg chg="modSld">
-      <pc:chgData name="Emilio Lehoucq" userId="S::elm8295@ads.northwestern.edu::fb1e86bc-2dff-49e3-9a0f-9c63245e88ac" providerId="AD" clId="Web-{B997FA96-47F4-F522-4B08-B6D6BAA276C3}" dt="2025-06-18T19:32:57.199" v="1" actId="20577"/>
-      <pc:docMkLst>
-        <pc:docMk/>
-      </pc:docMkLst>
-      <pc:sldChg chg="modSp">
-        <pc:chgData name="Emilio Lehoucq" userId="S::elm8295@ads.northwestern.edu::fb1e86bc-2dff-49e3-9a0f-9c63245e88ac" providerId="AD" clId="Web-{B997FA96-47F4-F522-4B08-B6D6BAA276C3}" dt="2025-06-18T19:32:57.199" v="1" actId="20577"/>
-        <pc:sldMkLst>
-          <pc:docMk/>
-          <pc:sldMk cId="3499594374" sldId="257"/>
-        </pc:sldMkLst>
-      </pc:sldChg>
-    </pc:docChg>
-  </pc:docChgLst>
-  <pc:docChgLst>
-    <pc:chgData name="Aaron M Geller" userId="S::amg416@ads.northwestern.edu::d8a535b4-4966-43c9-9db3-0de26afd9189" providerId="AD" clId="Web-{398799E6-8AD4-5B25-9873-FD34A3F03FF7}"/>
-    <pc:docChg chg="mod">
-      <pc:chgData name="Aaron M Geller" userId="S::amg416@ads.northwestern.edu::d8a535b4-4966-43c9-9db3-0de26afd9189" providerId="AD" clId="Web-{398799E6-8AD4-5B25-9873-FD34A3F03FF7}" dt="2025-05-13T14:10:27.268" v="0"/>
-      <pc:docMkLst>
-        <pc:docMk/>
-      </pc:docMkLst>
-    </pc:docChg>
-  </pc:docChgLst>
-  <pc:docChgLst>
     <pc:chgData name="Emilio Lehoucq" userId="S::elm8295@ads.northwestern.edu::fb1e86bc-2dff-49e3-9a0f-9c63245e88ac" providerId="AD" clId="Web-{B3B517CC-AA62-7417-4639-5FDED812E025}"/>
     <pc:docChg chg="delSld modSld">
       <pc:chgData name="Emilio Lehoucq" userId="S::elm8295@ads.northwestern.edu::fb1e86bc-2dff-49e3-9a0f-9c63245e88ac" providerId="AD" clId="Web-{B3B517CC-AA62-7417-4639-5FDED812E025}" dt="2024-10-21T20:57:39.148" v="3"/>
@@ -1559,6 +1534,31 @@
         <pc:sldMkLst>
           <pc:docMk/>
           <pc:sldMk cId="2176332958" sldId="265"/>
+        </pc:sldMkLst>
+      </pc:sldChg>
+    </pc:docChg>
+  </pc:docChgLst>
+  <pc:docChgLst>
+    <pc:chgData name="Aaron M Geller" userId="S::amg416@ads.northwestern.edu::d8a535b4-4966-43c9-9db3-0de26afd9189" providerId="AD" clId="Web-{398799E6-8AD4-5B25-9873-FD34A3F03FF7}"/>
+    <pc:docChg chg="mod">
+      <pc:chgData name="Aaron M Geller" userId="S::amg416@ads.northwestern.edu::d8a535b4-4966-43c9-9db3-0de26afd9189" providerId="AD" clId="Web-{398799E6-8AD4-5B25-9873-FD34A3F03FF7}" dt="2025-05-13T14:10:27.268" v="0"/>
+      <pc:docMkLst>
+        <pc:docMk/>
+      </pc:docMkLst>
+    </pc:docChg>
+  </pc:docChgLst>
+  <pc:docChgLst>
+    <pc:chgData name="Emilio Lehoucq" userId="S::elm8295@ads.northwestern.edu::fb1e86bc-2dff-49e3-9a0f-9c63245e88ac" providerId="AD" clId="Web-{B997FA96-47F4-F522-4B08-B6D6BAA276C3}"/>
+    <pc:docChg chg="modSld">
+      <pc:chgData name="Emilio Lehoucq" userId="S::elm8295@ads.northwestern.edu::fb1e86bc-2dff-49e3-9a0f-9c63245e88ac" providerId="AD" clId="Web-{B997FA96-47F4-F522-4B08-B6D6BAA276C3}" dt="2025-06-18T19:32:57.199" v="1" actId="20577"/>
+      <pc:docMkLst>
+        <pc:docMk/>
+      </pc:docMkLst>
+      <pc:sldChg chg="modSp">
+        <pc:chgData name="Emilio Lehoucq" userId="S::elm8295@ads.northwestern.edu::fb1e86bc-2dff-49e3-9a0f-9c63245e88ac" providerId="AD" clId="Web-{B997FA96-47F4-F522-4B08-B6D6BAA276C3}" dt="2025-06-18T19:32:57.199" v="1" actId="20577"/>
+        <pc:sldMkLst>
+          <pc:docMk/>
+          <pc:sldMk cId="3499594374" sldId="257"/>
         </pc:sldMkLst>
       </pc:sldChg>
     </pc:docChg>
@@ -5020,11 +5020,11 @@
     </dgm:pt>
   </dgm:ptLst>
   <dgm:cxnLst>
-    <dgm:cxn modelId="{3083F55B-397D-437F-8425-078792333A53}" srcId="{DB62CB19-FD52-442E-84DE-909E05470DEA}" destId="{5528D4E3-6CFF-4DAD-AFC0-0EB65673DB4D}" srcOrd="3" destOrd="0" parTransId="{3EC5C62F-07DF-4DA7-B18D-532857C459B4}" sibTransId="{144815CE-0E2E-410C-ACE2-D16DE19A4BEC}"/>
     <dgm:cxn modelId="{AA603543-4076-43DC-AC20-A6BB2BC2F80F}" type="presOf" srcId="{31177639-62DD-4990-B439-1A44B49E1A6C}" destId="{4B129B8D-4594-40D1-93AD-180D779051AD}" srcOrd="0" destOrd="0" presId="urn:microsoft.com/office/officeart/2005/8/layout/hProcess11"/>
     <dgm:cxn modelId="{BBA4164A-3FD9-426A-9929-5F76C66EEEAB}" srcId="{DB62CB19-FD52-442E-84DE-909E05470DEA}" destId="{E469CE39-B157-47DB-B5A4-8DC3F1570DA5}" srcOrd="4" destOrd="0" parTransId="{66039917-6827-43A1-99A6-49422C8998D6}" sibTransId="{11C3CFD9-C0EF-4453-A7A1-AAC684A9C8E5}"/>
+    <dgm:cxn modelId="{43D01D57-C21B-41D6-AD9B-DBCF6622AB51}" srcId="{DB62CB19-FD52-442E-84DE-909E05470DEA}" destId="{31177639-62DD-4990-B439-1A44B49E1A6C}" srcOrd="2" destOrd="0" parTransId="{4A2237A8-A219-4945-8C7B-7F9846B9CD33}" sibTransId="{0D876BDD-75CB-497F-9D4D-48BE6D59E5F6}"/>
+    <dgm:cxn modelId="{3083F55B-397D-437F-8425-078792333A53}" srcId="{DB62CB19-FD52-442E-84DE-909E05470DEA}" destId="{5528D4E3-6CFF-4DAD-AFC0-0EB65673DB4D}" srcOrd="3" destOrd="0" parTransId="{3EC5C62F-07DF-4DA7-B18D-532857C459B4}" sibTransId="{144815CE-0E2E-410C-ACE2-D16DE19A4BEC}"/>
     <dgm:cxn modelId="{9CDD5375-F3CB-4C32-8062-91E0D633DE94}" srcId="{DB62CB19-FD52-442E-84DE-909E05470DEA}" destId="{F2AB1F7A-F2CC-4A1E-ADD8-3BC976092868}" srcOrd="1" destOrd="0" parTransId="{DA5AD556-E04A-46A2-8848-412A6355E67A}" sibTransId="{28F6F361-CA86-43D8-A3CB-C233B67B6546}"/>
-    <dgm:cxn modelId="{43D01D57-C21B-41D6-AD9B-DBCF6622AB51}" srcId="{DB62CB19-FD52-442E-84DE-909E05470DEA}" destId="{31177639-62DD-4990-B439-1A44B49E1A6C}" srcOrd="2" destOrd="0" parTransId="{4A2237A8-A219-4945-8C7B-7F9846B9CD33}" sibTransId="{0D876BDD-75CB-497F-9D4D-48BE6D59E5F6}"/>
     <dgm:cxn modelId="{AB2AB18D-560E-441E-B69C-935278A8BF53}" srcId="{DB62CB19-FD52-442E-84DE-909E05470DEA}" destId="{8410C09F-A5C3-4733-9CE4-81356F3B4A91}" srcOrd="5" destOrd="0" parTransId="{81A47D94-8874-4E30-BDD8-6B4F0E48721B}" sibTransId="{B0E3315B-C142-4D68-AA92-1DFAC9EB720F}"/>
     <dgm:cxn modelId="{D4467F97-4672-4520-B87E-2C4DF59E6098}" type="presOf" srcId="{0E6BC35C-EE81-4F8D-8303-A65DF8B99594}" destId="{BB78A87E-E31F-4113-ACED-615634A5864C}" srcOrd="0" destOrd="0" presId="urn:microsoft.com/office/officeart/2005/8/layout/hProcess11"/>
     <dgm:cxn modelId="{0059F5B5-74F3-4918-8D68-2946C295918D}" type="presOf" srcId="{F2AB1F7A-F2CC-4A1E-ADD8-3BC976092868}" destId="{3570A1A9-B06B-4285-B0F0-B3E2950D0432}" srcOrd="0" destOrd="0" presId="urn:microsoft.com/office/officeart/2005/8/layout/hProcess11"/>
@@ -5283,10 +5283,10 @@
     <dgm:cxn modelId="{B60FEA13-FF70-4957-A9BF-0582FE83F209}" type="presOf" srcId="{8DB68EC6-5009-4C07-8973-AC4740E8FB35}" destId="{B6EF3F85-1838-4D72-9E09-D0B7E6FB4977}" srcOrd="0" destOrd="0" presId="urn:microsoft.com/office/officeart/2005/8/layout/cycle7"/>
     <dgm:cxn modelId="{453DCA2A-81B2-4A2A-B932-5499D281923B}" type="presOf" srcId="{BFC9269A-2CBF-443F-8798-B673C7ADA28A}" destId="{4832DC17-4445-4EB6-9380-9EF2A4070A3F}" srcOrd="0" destOrd="0" presId="urn:microsoft.com/office/officeart/2005/8/layout/cycle7"/>
     <dgm:cxn modelId="{83159147-D8CD-4D15-8CAA-ACED1F6A2A59}" srcId="{768169AE-2CED-4EE8-B69B-36A304341B84}" destId="{8DB68EC6-5009-4C07-8973-AC4740E8FB35}" srcOrd="2" destOrd="0" parTransId="{14EA4250-7BC1-4E7F-8868-2459614C4C1E}" sibTransId="{8B5EAFDE-FF10-4651-894A-110FD5BDD30E}"/>
+    <dgm:cxn modelId="{34E63A53-E6BC-4F63-AFCC-534282330DF7}" type="presOf" srcId="{4D2FD35C-70C3-44E6-9904-0E9FF7FBE6FE}" destId="{2B1A49C9-9E85-4766-8518-A7DCA3F6B18F}" srcOrd="0" destOrd="0" presId="urn:microsoft.com/office/officeart/2005/8/layout/cycle7"/>
+    <dgm:cxn modelId="{3A222954-6DD7-4C03-8E44-F02EB220FFE6}" srcId="{768169AE-2CED-4EE8-B69B-36A304341B84}" destId="{BFC9269A-2CBF-443F-8798-B673C7ADA28A}" srcOrd="1" destOrd="0" parTransId="{35660AF5-84DE-41D8-B674-F51AF1760684}" sibTransId="{4D2FD35C-70C3-44E6-9904-0E9FF7FBE6FE}"/>
     <dgm:cxn modelId="{0862D26C-CDB1-4A58-B48C-EE4F12D084C5}" type="presOf" srcId="{4D2FD35C-70C3-44E6-9904-0E9FF7FBE6FE}" destId="{36243CF8-4FBD-4AD5-B473-09425CF7283B}" srcOrd="1" destOrd="0" presId="urn:microsoft.com/office/officeart/2005/8/layout/cycle7"/>
     <dgm:cxn modelId="{47832D73-DC2B-4FE7-91EB-FBA6C1CFACCF}" type="presOf" srcId="{8B5EAFDE-FF10-4651-894A-110FD5BDD30E}" destId="{4AF217BD-9F2C-44CE-95D1-3579BC9E398F}" srcOrd="0" destOrd="0" presId="urn:microsoft.com/office/officeart/2005/8/layout/cycle7"/>
-    <dgm:cxn modelId="{34E63A53-E6BC-4F63-AFCC-534282330DF7}" type="presOf" srcId="{4D2FD35C-70C3-44E6-9904-0E9FF7FBE6FE}" destId="{2B1A49C9-9E85-4766-8518-A7DCA3F6B18F}" srcOrd="0" destOrd="0" presId="urn:microsoft.com/office/officeart/2005/8/layout/cycle7"/>
-    <dgm:cxn modelId="{3A222954-6DD7-4C03-8E44-F02EB220FFE6}" srcId="{768169AE-2CED-4EE8-B69B-36A304341B84}" destId="{BFC9269A-2CBF-443F-8798-B673C7ADA28A}" srcOrd="1" destOrd="0" parTransId="{35660AF5-84DE-41D8-B674-F51AF1760684}" sibTransId="{4D2FD35C-70C3-44E6-9904-0E9FF7FBE6FE}"/>
     <dgm:cxn modelId="{3F1A82D0-42E3-445E-99D8-904D9F4F7CF5}" srcId="{768169AE-2CED-4EE8-B69B-36A304341B84}" destId="{65E3DB45-0052-444B-8440-1D55E77D17E0}" srcOrd="0" destOrd="0" parTransId="{DA6AC346-71FA-4729-90F7-6FA28E3290CD}" sibTransId="{D6DA5B29-CF3A-4B99-9865-64BCF71F1F87}"/>
     <dgm:cxn modelId="{A1ED19DF-1CCC-4297-8C64-1AE3C6552855}" type="presOf" srcId="{768169AE-2CED-4EE8-B69B-36A304341B84}" destId="{E4693074-50FC-4A31-BCCD-2CCC16EC80B4}" srcOrd="0" destOrd="0" presId="urn:microsoft.com/office/officeart/2005/8/layout/cycle7"/>
     <dgm:cxn modelId="{21D789E2-41CE-4628-AFEF-F4AE5EBE3DD1}" type="presOf" srcId="{D6DA5B29-CF3A-4B99-9865-64BCF71F1F87}" destId="{E06EBEA8-44C6-451D-95F1-6CB870E3290E}" srcOrd="0" destOrd="0" presId="urn:microsoft.com/office/officeart/2005/8/layout/cycle7"/>
@@ -9137,7 +9137,7 @@
           </a:lstStyle>
           <a:p>
             <a:fld id="{FFEE8BD1-4CD9-4E23-9BB3-F9FF5D2B01EB}" type="datetimeFigureOut">
-              <a:t>8/29/2025</a:t>
+              <a:t>9/3/25</a:t>
             </a:fld>
             <a:endParaRPr lang="en-US"/>
           </a:p>
@@ -11238,7 +11238,7 @@
           <a:p>
             <a:fld id="{0C56C575-D94E-F044-B574-12900C1740FB}" type="datetimeFigureOut">
               <a:rPr lang="en-US" smtClean="0"/>
-              <a:t>8/29/2025</a:t>
+              <a:t>9/3/25</a:t>
             </a:fld>
             <a:endParaRPr lang="en-US"/>
           </a:p>
@@ -11542,7 +11542,7 @@
           <a:p>
             <a:fld id="{0C56C575-D94E-F044-B574-12900C1740FB}" type="datetimeFigureOut">
               <a:rPr lang="en-US" smtClean="0"/>
-              <a:t>8/29/2025</a:t>
+              <a:t>9/3/25</a:t>
             </a:fld>
             <a:endParaRPr lang="en-US"/>
           </a:p>
@@ -11740,7 +11740,7 @@
           <a:p>
             <a:fld id="{0C56C575-D94E-F044-B574-12900C1740FB}" type="datetimeFigureOut">
               <a:rPr lang="en-US" smtClean="0"/>
-              <a:t>8/29/2025</a:t>
+              <a:t>9/3/25</a:t>
             </a:fld>
             <a:endParaRPr lang="en-US"/>
           </a:p>
@@ -11948,7 +11948,7 @@
           <a:p>
             <a:fld id="{0C56C575-D94E-F044-B574-12900C1740FB}" type="datetimeFigureOut">
               <a:rPr lang="en-US" smtClean="0"/>
-              <a:t>8/29/2025</a:t>
+              <a:t>9/3/25</a:t>
             </a:fld>
             <a:endParaRPr lang="en-US"/>
           </a:p>
@@ -12297,7 +12297,7 @@
           <a:p>
             <a:fld id="{0C56C575-D94E-F044-B574-12900C1740FB}" type="datetimeFigureOut">
               <a:rPr lang="en-US" smtClean="0"/>
-              <a:t>8/29/2025</a:t>
+              <a:t>9/3/25</a:t>
             </a:fld>
             <a:endParaRPr lang="en-US"/>
           </a:p>
@@ -12581,7 +12581,7 @@
           <a:p>
             <a:fld id="{0C56C575-D94E-F044-B574-12900C1740FB}" type="datetimeFigureOut">
               <a:rPr lang="en-US" smtClean="0"/>
-              <a:t>8/29/2025</a:t>
+              <a:t>9/3/25</a:t>
             </a:fld>
             <a:endParaRPr lang="en-US"/>
           </a:p>
@@ -12960,7 +12960,7 @@
           <a:p>
             <a:fld id="{0C56C575-D94E-F044-B574-12900C1740FB}" type="datetimeFigureOut">
               <a:rPr lang="en-US" smtClean="0"/>
-              <a:t>8/29/2025</a:t>
+              <a:t>9/3/25</a:t>
             </a:fld>
             <a:endParaRPr lang="en-US"/>
           </a:p>
@@ -13225,7 +13225,7 @@
           <a:p>
             <a:fld id="{0C56C575-D94E-F044-B574-12900C1740FB}" type="datetimeFigureOut">
               <a:rPr lang="en-US" smtClean="0"/>
-              <a:t>8/29/2025</a:t>
+              <a:t>9/3/25</a:t>
             </a:fld>
             <a:endParaRPr lang="en-US"/>
           </a:p>
@@ -13637,7 +13637,7 @@
           <a:p>
             <a:fld id="{0C56C575-D94E-F044-B574-12900C1740FB}" type="datetimeFigureOut">
               <a:rPr lang="en-US" smtClean="0"/>
-              <a:t>8/29/2025</a:t>
+              <a:t>9/3/25</a:t>
             </a:fld>
             <a:endParaRPr lang="en-US"/>
           </a:p>
@@ -13778,7 +13778,7 @@
           <a:p>
             <a:fld id="{0C56C575-D94E-F044-B574-12900C1740FB}" type="datetimeFigureOut">
               <a:rPr lang="en-US" smtClean="0"/>
-              <a:t>8/29/2025</a:t>
+              <a:t>9/3/25</a:t>
             </a:fld>
             <a:endParaRPr lang="en-US"/>
           </a:p>
@@ -13891,7 +13891,7 @@
           <a:p>
             <a:fld id="{0C56C575-D94E-F044-B574-12900C1740FB}" type="datetimeFigureOut">
               <a:rPr lang="en-US" smtClean="0"/>
-              <a:t>8/29/2025</a:t>
+              <a:t>9/3/25</a:t>
             </a:fld>
             <a:endParaRPr lang="en-US"/>
           </a:p>
@@ -14218,7 +14218,7 @@
           <a:p>
             <a:fld id="{0C56C575-D94E-F044-B574-12900C1740FB}" type="datetimeFigureOut">
               <a:rPr lang="en-US" smtClean="0"/>
-              <a:t>8/29/2025</a:t>
+              <a:t>9/3/25</a:t>
             </a:fld>
             <a:endParaRPr lang="en-US"/>
           </a:p>
@@ -14459,7 +14459,7 @@
           <a:p>
             <a:fld id="{0C56C575-D94E-F044-B574-12900C1740FB}" type="datetimeFigureOut">
               <a:rPr lang="en-US" smtClean="0"/>
-              <a:t>8/29/2025</a:t>
+              <a:t>9/3/25</a:t>
             </a:fld>
             <a:endParaRPr lang="en-US"/>
           </a:p>
@@ -15563,31 +15563,31 @@
           <a:lstStyle/>
           <a:p>
             <a:r>
-              <a:rPr lang="en-US"/>
+              <a:rPr lang="en-US" dirty="0"/>
               <a:t>Say you are in the school of communications.</a:t>
             </a:r>
           </a:p>
           <a:p>
             <a:r>
-              <a:rPr lang="en-US"/>
+              <a:rPr lang="en-US" dirty="0"/>
               <a:t>You want to study whether newspapers in the United States have tended to cover the economy from a protectionist or anti-protectionist perspective over time and across different states.</a:t>
             </a:r>
           </a:p>
           <a:p>
             <a:r>
-              <a:rPr lang="en-US"/>
+              <a:rPr lang="en-US" dirty="0"/>
               <a:t>Luckily, you got access to a dataset of tens of thousands of articles over the past 25 years.</a:t>
             </a:r>
           </a:p>
           <a:p>
             <a:r>
-              <a:rPr lang="en-US"/>
+              <a:rPr lang="en-US" dirty="0"/>
               <a:t>Now you have to go through each of those tens of thousands of articles, read it, and categorize it. Does it adopt a protectionist or anti-protectionist perspective?</a:t>
             </a:r>
           </a:p>
           <a:p>
             <a:r>
-              <a:rPr lang="en-US"/>
+              <a:rPr lang="en-US" dirty="0"/>
               <a:t>That's a lot to do! How can you do it?</a:t>
             </a:r>
           </a:p>
@@ -15603,6 +15603,281 @@
   <p:clrMapOvr>
     <a:masterClrMapping/>
   </p:clrMapOvr>
+  <p:timing>
+    <p:tnLst>
+      <p:par>
+        <p:cTn id="1" dur="indefinite" restart="never" nodeType="tmRoot">
+          <p:childTnLst>
+            <p:seq concurrent="1" nextAc="seek">
+              <p:cTn id="2" dur="indefinite" nodeType="mainSeq">
+                <p:childTnLst>
+                  <p:par>
+                    <p:cTn id="3" fill="hold">
+                      <p:stCondLst>
+                        <p:cond delay="indefinite"/>
+                      </p:stCondLst>
+                      <p:childTnLst>
+                        <p:par>
+                          <p:cTn id="4" fill="hold">
+                            <p:stCondLst>
+                              <p:cond delay="0"/>
+                            </p:stCondLst>
+                            <p:childTnLst>
+                              <p:par>
+                                <p:cTn id="5" presetID="1" presetClass="entr" presetSubtype="0" fill="hold" nodeType="clickEffect">
+                                  <p:stCondLst>
+                                    <p:cond delay="0"/>
+                                  </p:stCondLst>
+                                  <p:childTnLst>
+                                    <p:set>
+                                      <p:cBhvr>
+                                        <p:cTn id="6" dur="1" fill="hold">
+                                          <p:stCondLst>
+                                            <p:cond delay="0"/>
+                                          </p:stCondLst>
+                                        </p:cTn>
+                                        <p:tgtEl>
+                                          <p:spTgt spid="3">
+                                            <p:txEl>
+                                              <p:pRg st="0" end="0"/>
+                                            </p:txEl>
+                                          </p:spTgt>
+                                        </p:tgtEl>
+                                        <p:attrNameLst>
+                                          <p:attrName>style.visibility</p:attrName>
+                                        </p:attrNameLst>
+                                      </p:cBhvr>
+                                      <p:to>
+                                        <p:strVal val="visible"/>
+                                      </p:to>
+                                    </p:set>
+                                  </p:childTnLst>
+                                </p:cTn>
+                              </p:par>
+                            </p:childTnLst>
+                          </p:cTn>
+                        </p:par>
+                      </p:childTnLst>
+                    </p:cTn>
+                  </p:par>
+                  <p:par>
+                    <p:cTn id="7" fill="hold">
+                      <p:stCondLst>
+                        <p:cond delay="indefinite"/>
+                      </p:stCondLst>
+                      <p:childTnLst>
+                        <p:par>
+                          <p:cTn id="8" fill="hold">
+                            <p:stCondLst>
+                              <p:cond delay="0"/>
+                            </p:stCondLst>
+                            <p:childTnLst>
+                              <p:par>
+                                <p:cTn id="9" presetID="1" presetClass="entr" presetSubtype="0" fill="hold" nodeType="clickEffect">
+                                  <p:stCondLst>
+                                    <p:cond delay="0"/>
+                                  </p:stCondLst>
+                                  <p:childTnLst>
+                                    <p:set>
+                                      <p:cBhvr>
+                                        <p:cTn id="10" dur="1" fill="hold">
+                                          <p:stCondLst>
+                                            <p:cond delay="0"/>
+                                          </p:stCondLst>
+                                        </p:cTn>
+                                        <p:tgtEl>
+                                          <p:spTgt spid="3">
+                                            <p:txEl>
+                                              <p:pRg st="1" end="1"/>
+                                            </p:txEl>
+                                          </p:spTgt>
+                                        </p:tgtEl>
+                                        <p:attrNameLst>
+                                          <p:attrName>style.visibility</p:attrName>
+                                        </p:attrNameLst>
+                                      </p:cBhvr>
+                                      <p:to>
+                                        <p:strVal val="visible"/>
+                                      </p:to>
+                                    </p:set>
+                                  </p:childTnLst>
+                                </p:cTn>
+                              </p:par>
+                            </p:childTnLst>
+                          </p:cTn>
+                        </p:par>
+                      </p:childTnLst>
+                    </p:cTn>
+                  </p:par>
+                  <p:par>
+                    <p:cTn id="11" fill="hold">
+                      <p:stCondLst>
+                        <p:cond delay="indefinite"/>
+                      </p:stCondLst>
+                      <p:childTnLst>
+                        <p:par>
+                          <p:cTn id="12" fill="hold">
+                            <p:stCondLst>
+                              <p:cond delay="0"/>
+                            </p:stCondLst>
+                            <p:childTnLst>
+                              <p:par>
+                                <p:cTn id="13" presetID="1" presetClass="entr" presetSubtype="0" fill="hold" nodeType="clickEffect">
+                                  <p:stCondLst>
+                                    <p:cond delay="0"/>
+                                  </p:stCondLst>
+                                  <p:childTnLst>
+                                    <p:set>
+                                      <p:cBhvr>
+                                        <p:cTn id="14" dur="1" fill="hold">
+                                          <p:stCondLst>
+                                            <p:cond delay="0"/>
+                                          </p:stCondLst>
+                                        </p:cTn>
+                                        <p:tgtEl>
+                                          <p:spTgt spid="3">
+                                            <p:txEl>
+                                              <p:pRg st="2" end="2"/>
+                                            </p:txEl>
+                                          </p:spTgt>
+                                        </p:tgtEl>
+                                        <p:attrNameLst>
+                                          <p:attrName>style.visibility</p:attrName>
+                                        </p:attrNameLst>
+                                      </p:cBhvr>
+                                      <p:to>
+                                        <p:strVal val="visible"/>
+                                      </p:to>
+                                    </p:set>
+                                  </p:childTnLst>
+                                </p:cTn>
+                              </p:par>
+                            </p:childTnLst>
+                          </p:cTn>
+                        </p:par>
+                      </p:childTnLst>
+                    </p:cTn>
+                  </p:par>
+                  <p:par>
+                    <p:cTn id="15" fill="hold">
+                      <p:stCondLst>
+                        <p:cond delay="indefinite"/>
+                      </p:stCondLst>
+                      <p:childTnLst>
+                        <p:par>
+                          <p:cTn id="16" fill="hold">
+                            <p:stCondLst>
+                              <p:cond delay="0"/>
+                            </p:stCondLst>
+                            <p:childTnLst>
+                              <p:par>
+                                <p:cTn id="17" presetID="1" presetClass="entr" presetSubtype="0" fill="hold" nodeType="clickEffect">
+                                  <p:stCondLst>
+                                    <p:cond delay="0"/>
+                                  </p:stCondLst>
+                                  <p:childTnLst>
+                                    <p:set>
+                                      <p:cBhvr>
+                                        <p:cTn id="18" dur="1" fill="hold">
+                                          <p:stCondLst>
+                                            <p:cond delay="0"/>
+                                          </p:stCondLst>
+                                        </p:cTn>
+                                        <p:tgtEl>
+                                          <p:spTgt spid="3">
+                                            <p:txEl>
+                                              <p:pRg st="3" end="3"/>
+                                            </p:txEl>
+                                          </p:spTgt>
+                                        </p:tgtEl>
+                                        <p:attrNameLst>
+                                          <p:attrName>style.visibility</p:attrName>
+                                        </p:attrNameLst>
+                                      </p:cBhvr>
+                                      <p:to>
+                                        <p:strVal val="visible"/>
+                                      </p:to>
+                                    </p:set>
+                                  </p:childTnLst>
+                                </p:cTn>
+                              </p:par>
+                            </p:childTnLst>
+                          </p:cTn>
+                        </p:par>
+                      </p:childTnLst>
+                    </p:cTn>
+                  </p:par>
+                  <p:par>
+                    <p:cTn id="19" fill="hold">
+                      <p:stCondLst>
+                        <p:cond delay="indefinite"/>
+                      </p:stCondLst>
+                      <p:childTnLst>
+                        <p:par>
+                          <p:cTn id="20" fill="hold">
+                            <p:stCondLst>
+                              <p:cond delay="0"/>
+                            </p:stCondLst>
+                            <p:childTnLst>
+                              <p:par>
+                                <p:cTn id="21" presetID="1" presetClass="entr" presetSubtype="0" fill="hold" nodeType="clickEffect">
+                                  <p:stCondLst>
+                                    <p:cond delay="0"/>
+                                  </p:stCondLst>
+                                  <p:childTnLst>
+                                    <p:set>
+                                      <p:cBhvr>
+                                        <p:cTn id="22" dur="1" fill="hold">
+                                          <p:stCondLst>
+                                            <p:cond delay="0"/>
+                                          </p:stCondLst>
+                                        </p:cTn>
+                                        <p:tgtEl>
+                                          <p:spTgt spid="3">
+                                            <p:txEl>
+                                              <p:pRg st="4" end="4"/>
+                                            </p:txEl>
+                                          </p:spTgt>
+                                        </p:tgtEl>
+                                        <p:attrNameLst>
+                                          <p:attrName>style.visibility</p:attrName>
+                                        </p:attrNameLst>
+                                      </p:cBhvr>
+                                      <p:to>
+                                        <p:strVal val="visible"/>
+                                      </p:to>
+                                    </p:set>
+                                  </p:childTnLst>
+                                </p:cTn>
+                              </p:par>
+                            </p:childTnLst>
+                          </p:cTn>
+                        </p:par>
+                      </p:childTnLst>
+                    </p:cTn>
+                  </p:par>
+                </p:childTnLst>
+              </p:cTn>
+              <p:prevCondLst>
+                <p:cond evt="onPrev" delay="0">
+                  <p:tgtEl>
+                    <p:sldTgt/>
+                  </p:tgtEl>
+                </p:cond>
+              </p:prevCondLst>
+              <p:nextCondLst>
+                <p:cond evt="onNext" delay="0">
+                  <p:tgtEl>
+                    <p:sldTgt/>
+                  </p:tgtEl>
+                </p:cond>
+              </p:nextCondLst>
+            </p:seq>
+          </p:childTnLst>
+        </p:cTn>
+      </p:par>
+    </p:tnLst>
+  </p:timing>
 </p:sld>
 </file>
 
@@ -15675,25 +15950,25 @@
           <a:lstStyle/>
           <a:p>
             <a:r>
-              <a:rPr lang="en-US"/>
+              <a:rPr lang="en-US" dirty="0"/>
               <a:t>One approach would be to create a dictionary with protectionist terms and anti-protectionist terms. You can then tokenize the news articles and count the prevalence of protectionist vs anti-protectionist terms.</a:t>
             </a:r>
           </a:p>
           <a:p>
             <a:r>
-              <a:rPr lang="en-US"/>
+              <a:rPr lang="en-US" dirty="0"/>
               <a:t>This approach could be a reasonable starting place. You don't need to manually label data, it's easy to implement, and you know exactly what it's doing.</a:t>
             </a:r>
           </a:p>
           <a:p>
             <a:r>
-              <a:rPr lang="en-US"/>
+              <a:rPr lang="en-US" dirty="0"/>
               <a:t>However, this approach doesn't account for how words are used (ambiguity, context, negation) and may miss relevant words.</a:t>
             </a:r>
           </a:p>
           <a:p>
             <a:r>
-              <a:rPr lang="en-US"/>
+              <a:rPr lang="en-US" dirty="0"/>
               <a:t>So, what else could you do?</a:t>
             </a:r>
           </a:p>
@@ -15709,6 +15984,232 @@
   <p:clrMapOvr>
     <a:masterClrMapping/>
   </p:clrMapOvr>
+  <p:timing>
+    <p:tnLst>
+      <p:par>
+        <p:cTn id="1" dur="indefinite" restart="never" nodeType="tmRoot">
+          <p:childTnLst>
+            <p:seq concurrent="1" nextAc="seek">
+              <p:cTn id="2" dur="indefinite" nodeType="mainSeq">
+                <p:childTnLst>
+                  <p:par>
+                    <p:cTn id="3" fill="hold">
+                      <p:stCondLst>
+                        <p:cond delay="indefinite"/>
+                      </p:stCondLst>
+                      <p:childTnLst>
+                        <p:par>
+                          <p:cTn id="4" fill="hold">
+                            <p:stCondLst>
+                              <p:cond delay="0"/>
+                            </p:stCondLst>
+                            <p:childTnLst>
+                              <p:par>
+                                <p:cTn id="5" presetID="1" presetClass="entr" presetSubtype="0" fill="hold" nodeType="clickEffect">
+                                  <p:stCondLst>
+                                    <p:cond delay="0"/>
+                                  </p:stCondLst>
+                                  <p:childTnLst>
+                                    <p:set>
+                                      <p:cBhvr>
+                                        <p:cTn id="6" dur="1" fill="hold">
+                                          <p:stCondLst>
+                                            <p:cond delay="0"/>
+                                          </p:stCondLst>
+                                        </p:cTn>
+                                        <p:tgtEl>
+                                          <p:spTgt spid="3">
+                                            <p:txEl>
+                                              <p:pRg st="0" end="0"/>
+                                            </p:txEl>
+                                          </p:spTgt>
+                                        </p:tgtEl>
+                                        <p:attrNameLst>
+                                          <p:attrName>style.visibility</p:attrName>
+                                        </p:attrNameLst>
+                                      </p:cBhvr>
+                                      <p:to>
+                                        <p:strVal val="visible"/>
+                                      </p:to>
+                                    </p:set>
+                                  </p:childTnLst>
+                                </p:cTn>
+                              </p:par>
+                            </p:childTnLst>
+                          </p:cTn>
+                        </p:par>
+                      </p:childTnLst>
+                    </p:cTn>
+                  </p:par>
+                  <p:par>
+                    <p:cTn id="7" fill="hold">
+                      <p:stCondLst>
+                        <p:cond delay="indefinite"/>
+                      </p:stCondLst>
+                      <p:childTnLst>
+                        <p:par>
+                          <p:cTn id="8" fill="hold">
+                            <p:stCondLst>
+                              <p:cond delay="0"/>
+                            </p:stCondLst>
+                            <p:childTnLst>
+                              <p:par>
+                                <p:cTn id="9" presetID="1" presetClass="entr" presetSubtype="0" fill="hold" nodeType="clickEffect">
+                                  <p:stCondLst>
+                                    <p:cond delay="0"/>
+                                  </p:stCondLst>
+                                  <p:childTnLst>
+                                    <p:set>
+                                      <p:cBhvr>
+                                        <p:cTn id="10" dur="1" fill="hold">
+                                          <p:stCondLst>
+                                            <p:cond delay="0"/>
+                                          </p:stCondLst>
+                                        </p:cTn>
+                                        <p:tgtEl>
+                                          <p:spTgt spid="3">
+                                            <p:txEl>
+                                              <p:pRg st="1" end="1"/>
+                                            </p:txEl>
+                                          </p:spTgt>
+                                        </p:tgtEl>
+                                        <p:attrNameLst>
+                                          <p:attrName>style.visibility</p:attrName>
+                                        </p:attrNameLst>
+                                      </p:cBhvr>
+                                      <p:to>
+                                        <p:strVal val="visible"/>
+                                      </p:to>
+                                    </p:set>
+                                  </p:childTnLst>
+                                </p:cTn>
+                              </p:par>
+                            </p:childTnLst>
+                          </p:cTn>
+                        </p:par>
+                      </p:childTnLst>
+                    </p:cTn>
+                  </p:par>
+                  <p:par>
+                    <p:cTn id="11" fill="hold">
+                      <p:stCondLst>
+                        <p:cond delay="indefinite"/>
+                      </p:stCondLst>
+                      <p:childTnLst>
+                        <p:par>
+                          <p:cTn id="12" fill="hold">
+                            <p:stCondLst>
+                              <p:cond delay="0"/>
+                            </p:stCondLst>
+                            <p:childTnLst>
+                              <p:par>
+                                <p:cTn id="13" presetID="1" presetClass="entr" presetSubtype="0" fill="hold" nodeType="clickEffect">
+                                  <p:stCondLst>
+                                    <p:cond delay="0"/>
+                                  </p:stCondLst>
+                                  <p:childTnLst>
+                                    <p:set>
+                                      <p:cBhvr>
+                                        <p:cTn id="14" dur="1" fill="hold">
+                                          <p:stCondLst>
+                                            <p:cond delay="0"/>
+                                          </p:stCondLst>
+                                        </p:cTn>
+                                        <p:tgtEl>
+                                          <p:spTgt spid="3">
+                                            <p:txEl>
+                                              <p:pRg st="2" end="2"/>
+                                            </p:txEl>
+                                          </p:spTgt>
+                                        </p:tgtEl>
+                                        <p:attrNameLst>
+                                          <p:attrName>style.visibility</p:attrName>
+                                        </p:attrNameLst>
+                                      </p:cBhvr>
+                                      <p:to>
+                                        <p:strVal val="visible"/>
+                                      </p:to>
+                                    </p:set>
+                                  </p:childTnLst>
+                                </p:cTn>
+                              </p:par>
+                            </p:childTnLst>
+                          </p:cTn>
+                        </p:par>
+                      </p:childTnLst>
+                    </p:cTn>
+                  </p:par>
+                  <p:par>
+                    <p:cTn id="15" fill="hold">
+                      <p:stCondLst>
+                        <p:cond delay="indefinite"/>
+                      </p:stCondLst>
+                      <p:childTnLst>
+                        <p:par>
+                          <p:cTn id="16" fill="hold">
+                            <p:stCondLst>
+                              <p:cond delay="0"/>
+                            </p:stCondLst>
+                            <p:childTnLst>
+                              <p:par>
+                                <p:cTn id="17" presetID="1" presetClass="entr" presetSubtype="0" fill="hold" nodeType="clickEffect">
+                                  <p:stCondLst>
+                                    <p:cond delay="0"/>
+                                  </p:stCondLst>
+                                  <p:childTnLst>
+                                    <p:set>
+                                      <p:cBhvr>
+                                        <p:cTn id="18" dur="1" fill="hold">
+                                          <p:stCondLst>
+                                            <p:cond delay="0"/>
+                                          </p:stCondLst>
+                                        </p:cTn>
+                                        <p:tgtEl>
+                                          <p:spTgt spid="3">
+                                            <p:txEl>
+                                              <p:pRg st="3" end="3"/>
+                                            </p:txEl>
+                                          </p:spTgt>
+                                        </p:tgtEl>
+                                        <p:attrNameLst>
+                                          <p:attrName>style.visibility</p:attrName>
+                                        </p:attrNameLst>
+                                      </p:cBhvr>
+                                      <p:to>
+                                        <p:strVal val="visible"/>
+                                      </p:to>
+                                    </p:set>
+                                  </p:childTnLst>
+                                </p:cTn>
+                              </p:par>
+                            </p:childTnLst>
+                          </p:cTn>
+                        </p:par>
+                      </p:childTnLst>
+                    </p:cTn>
+                  </p:par>
+                </p:childTnLst>
+              </p:cTn>
+              <p:prevCondLst>
+                <p:cond evt="onPrev" delay="0">
+                  <p:tgtEl>
+                    <p:sldTgt/>
+                  </p:tgtEl>
+                </p:cond>
+              </p:prevCondLst>
+              <p:nextCondLst>
+                <p:cond evt="onNext" delay="0">
+                  <p:tgtEl>
+                    <p:sldTgt/>
+                  </p:tgtEl>
+                </p:cond>
+              </p:nextCondLst>
+            </p:seq>
+          </p:childTnLst>
+        </p:cTn>
+      </p:par>
+    </p:tnLst>
+  </p:timing>
 </p:sld>
 </file>
 
@@ -15781,22 +16282,22 @@
           <a:lstStyle/>
           <a:p>
             <a:r>
-              <a:rPr lang="en-US"/>
+              <a:rPr lang="en-US" dirty="0"/>
               <a:t>Well, if you have enough money and patience, hire a bunch of research assistants! </a:t>
             </a:r>
           </a:p>
           <a:p>
-            <a:endParaRPr lang="en-US"/>
-          </a:p>
-          <a:p>
-            <a:r>
-              <a:rPr lang="en-US"/>
+            <a:endParaRPr lang="en-US" dirty="0"/>
+          </a:p>
+          <a:p>
+            <a:r>
+              <a:rPr lang="en-US" dirty="0"/>
               <a:t>Also, if you are familiar with machine learning, you can manually label a lot of news articles (or hire someone else to do it) and train a classifier. This is certainly a possible approach – but you'll likely need a lot of data.</a:t>
             </a:r>
           </a:p>
           <a:p>
             <a:r>
-              <a:rPr lang="en-US"/>
+              <a:rPr lang="en-US" dirty="0"/>
               <a:t>What else could you do?</a:t>
             </a:r>
           </a:p>
@@ -15812,6 +16313,183 @@
   <p:clrMapOvr>
     <a:masterClrMapping/>
   </p:clrMapOvr>
+  <p:timing>
+    <p:tnLst>
+      <p:par>
+        <p:cTn id="1" dur="indefinite" restart="never" nodeType="tmRoot">
+          <p:childTnLst>
+            <p:seq concurrent="1" nextAc="seek">
+              <p:cTn id="2" dur="indefinite" nodeType="mainSeq">
+                <p:childTnLst>
+                  <p:par>
+                    <p:cTn id="3" fill="hold">
+                      <p:stCondLst>
+                        <p:cond delay="indefinite"/>
+                      </p:stCondLst>
+                      <p:childTnLst>
+                        <p:par>
+                          <p:cTn id="4" fill="hold">
+                            <p:stCondLst>
+                              <p:cond delay="0"/>
+                            </p:stCondLst>
+                            <p:childTnLst>
+                              <p:par>
+                                <p:cTn id="5" presetID="1" presetClass="entr" presetSubtype="0" fill="hold" nodeType="clickEffect">
+                                  <p:stCondLst>
+                                    <p:cond delay="0"/>
+                                  </p:stCondLst>
+                                  <p:childTnLst>
+                                    <p:set>
+                                      <p:cBhvr>
+                                        <p:cTn id="6" dur="1" fill="hold">
+                                          <p:stCondLst>
+                                            <p:cond delay="0"/>
+                                          </p:stCondLst>
+                                        </p:cTn>
+                                        <p:tgtEl>
+                                          <p:spTgt spid="3">
+                                            <p:txEl>
+                                              <p:pRg st="0" end="0"/>
+                                            </p:txEl>
+                                          </p:spTgt>
+                                        </p:tgtEl>
+                                        <p:attrNameLst>
+                                          <p:attrName>style.visibility</p:attrName>
+                                        </p:attrNameLst>
+                                      </p:cBhvr>
+                                      <p:to>
+                                        <p:strVal val="visible"/>
+                                      </p:to>
+                                    </p:set>
+                                  </p:childTnLst>
+                                </p:cTn>
+                              </p:par>
+                            </p:childTnLst>
+                          </p:cTn>
+                        </p:par>
+                      </p:childTnLst>
+                    </p:cTn>
+                  </p:par>
+                  <p:par>
+                    <p:cTn id="7" fill="hold">
+                      <p:stCondLst>
+                        <p:cond delay="indefinite"/>
+                      </p:stCondLst>
+                      <p:childTnLst>
+                        <p:par>
+                          <p:cTn id="8" fill="hold">
+                            <p:stCondLst>
+                              <p:cond delay="0"/>
+                            </p:stCondLst>
+                            <p:childTnLst>
+                              <p:par>
+                                <p:cTn id="9" presetID="1" presetClass="entr" presetSubtype="0" fill="hold" nodeType="clickEffect">
+                                  <p:stCondLst>
+                                    <p:cond delay="0"/>
+                                  </p:stCondLst>
+                                  <p:childTnLst>
+                                    <p:set>
+                                      <p:cBhvr>
+                                        <p:cTn id="10" dur="1" fill="hold">
+                                          <p:stCondLst>
+                                            <p:cond delay="0"/>
+                                          </p:stCondLst>
+                                        </p:cTn>
+                                        <p:tgtEl>
+                                          <p:spTgt spid="3">
+                                            <p:txEl>
+                                              <p:pRg st="2" end="2"/>
+                                            </p:txEl>
+                                          </p:spTgt>
+                                        </p:tgtEl>
+                                        <p:attrNameLst>
+                                          <p:attrName>style.visibility</p:attrName>
+                                        </p:attrNameLst>
+                                      </p:cBhvr>
+                                      <p:to>
+                                        <p:strVal val="visible"/>
+                                      </p:to>
+                                    </p:set>
+                                  </p:childTnLst>
+                                </p:cTn>
+                              </p:par>
+                            </p:childTnLst>
+                          </p:cTn>
+                        </p:par>
+                      </p:childTnLst>
+                    </p:cTn>
+                  </p:par>
+                  <p:par>
+                    <p:cTn id="11" fill="hold">
+                      <p:stCondLst>
+                        <p:cond delay="indefinite"/>
+                      </p:stCondLst>
+                      <p:childTnLst>
+                        <p:par>
+                          <p:cTn id="12" fill="hold">
+                            <p:stCondLst>
+                              <p:cond delay="0"/>
+                            </p:stCondLst>
+                            <p:childTnLst>
+                              <p:par>
+                                <p:cTn id="13" presetID="1" presetClass="entr" presetSubtype="0" fill="hold" nodeType="clickEffect">
+                                  <p:stCondLst>
+                                    <p:cond delay="0"/>
+                                  </p:stCondLst>
+                                  <p:childTnLst>
+                                    <p:set>
+                                      <p:cBhvr>
+                                        <p:cTn id="14" dur="1" fill="hold">
+                                          <p:stCondLst>
+                                            <p:cond delay="0"/>
+                                          </p:stCondLst>
+                                        </p:cTn>
+                                        <p:tgtEl>
+                                          <p:spTgt spid="3">
+                                            <p:txEl>
+                                              <p:pRg st="3" end="3"/>
+                                            </p:txEl>
+                                          </p:spTgt>
+                                        </p:tgtEl>
+                                        <p:attrNameLst>
+                                          <p:attrName>style.visibility</p:attrName>
+                                        </p:attrNameLst>
+                                      </p:cBhvr>
+                                      <p:to>
+                                        <p:strVal val="visible"/>
+                                      </p:to>
+                                    </p:set>
+                                  </p:childTnLst>
+                                </p:cTn>
+                              </p:par>
+                            </p:childTnLst>
+                          </p:cTn>
+                        </p:par>
+                      </p:childTnLst>
+                    </p:cTn>
+                  </p:par>
+                </p:childTnLst>
+              </p:cTn>
+              <p:prevCondLst>
+                <p:cond evt="onPrev" delay="0">
+                  <p:tgtEl>
+                    <p:sldTgt/>
+                  </p:tgtEl>
+                </p:cond>
+              </p:prevCondLst>
+              <p:nextCondLst>
+                <p:cond evt="onNext" delay="0">
+                  <p:tgtEl>
+                    <p:sldTgt/>
+                  </p:tgtEl>
+                </p:cond>
+              </p:nextCondLst>
+            </p:seq>
+          </p:childTnLst>
+        </p:cTn>
+      </p:par>
+    </p:tnLst>
+  </p:timing>
 </p:sld>
 </file>
 
@@ -15884,32 +16562,31 @@
           <a:lstStyle/>
           <a:p>
             <a:r>
-              <a:rPr lang="en-US"/>
+              <a:rPr lang="en-US" dirty="0"/>
               <a:t>You can use one of the models like those behind ChatGPT, feed them one article at the time, and ask them to classify it into protectionist vs anti-protectionist.</a:t>
             </a:r>
-            <a:endParaRPr lang="en-US" err="1"/>
-          </a:p>
-          <a:p>
-            <a:r>
-              <a:rPr lang="en-US"/>
+          </a:p>
+          <a:p>
+            <a:r>
+              <a:rPr lang="en-US" dirty="0"/>
               <a:t>That's a reasonable approach. And you should probably try it with a sample of articles to see how well it works.</a:t>
             </a:r>
           </a:p>
           <a:p>
             <a:r>
-              <a:rPr lang="en-US"/>
+              <a:rPr lang="en-US" dirty="0"/>
               <a:t>However, while you can ask models like the ones behind ChatGPT to classify news articles, that's not the specific task that they are trained for. You can get a smaller, specialized model to do it more efficiently.</a:t>
             </a:r>
           </a:p>
           <a:p>
             <a:r>
-              <a:rPr lang="en-US"/>
+              <a:rPr lang="en-US" dirty="0"/>
               <a:t>Also, using a model like those behind ChatGPT may cost you money.</a:t>
             </a:r>
           </a:p>
           <a:p>
             <a:r>
-              <a:rPr lang="en-US"/>
+              <a:rPr lang="en-US" dirty="0"/>
               <a:t>Finally, using models like those behind ChatGPT poses issues with reproducibility and replicability.</a:t>
             </a:r>
           </a:p>
@@ -15925,6 +16602,281 @@
   <p:clrMapOvr>
     <a:masterClrMapping/>
   </p:clrMapOvr>
+  <p:timing>
+    <p:tnLst>
+      <p:par>
+        <p:cTn id="1" dur="indefinite" restart="never" nodeType="tmRoot">
+          <p:childTnLst>
+            <p:seq concurrent="1" nextAc="seek">
+              <p:cTn id="2" dur="indefinite" nodeType="mainSeq">
+                <p:childTnLst>
+                  <p:par>
+                    <p:cTn id="3" fill="hold">
+                      <p:stCondLst>
+                        <p:cond delay="indefinite"/>
+                      </p:stCondLst>
+                      <p:childTnLst>
+                        <p:par>
+                          <p:cTn id="4" fill="hold">
+                            <p:stCondLst>
+                              <p:cond delay="0"/>
+                            </p:stCondLst>
+                            <p:childTnLst>
+                              <p:par>
+                                <p:cTn id="5" presetID="1" presetClass="entr" presetSubtype="0" fill="hold" nodeType="clickEffect">
+                                  <p:stCondLst>
+                                    <p:cond delay="0"/>
+                                  </p:stCondLst>
+                                  <p:childTnLst>
+                                    <p:set>
+                                      <p:cBhvr>
+                                        <p:cTn id="6" dur="1" fill="hold">
+                                          <p:stCondLst>
+                                            <p:cond delay="0"/>
+                                          </p:stCondLst>
+                                        </p:cTn>
+                                        <p:tgtEl>
+                                          <p:spTgt spid="3">
+                                            <p:txEl>
+                                              <p:pRg st="0" end="0"/>
+                                            </p:txEl>
+                                          </p:spTgt>
+                                        </p:tgtEl>
+                                        <p:attrNameLst>
+                                          <p:attrName>style.visibility</p:attrName>
+                                        </p:attrNameLst>
+                                      </p:cBhvr>
+                                      <p:to>
+                                        <p:strVal val="visible"/>
+                                      </p:to>
+                                    </p:set>
+                                  </p:childTnLst>
+                                </p:cTn>
+                              </p:par>
+                            </p:childTnLst>
+                          </p:cTn>
+                        </p:par>
+                      </p:childTnLst>
+                    </p:cTn>
+                  </p:par>
+                  <p:par>
+                    <p:cTn id="7" fill="hold">
+                      <p:stCondLst>
+                        <p:cond delay="indefinite"/>
+                      </p:stCondLst>
+                      <p:childTnLst>
+                        <p:par>
+                          <p:cTn id="8" fill="hold">
+                            <p:stCondLst>
+                              <p:cond delay="0"/>
+                            </p:stCondLst>
+                            <p:childTnLst>
+                              <p:par>
+                                <p:cTn id="9" presetID="1" presetClass="entr" presetSubtype="0" fill="hold" nodeType="clickEffect">
+                                  <p:stCondLst>
+                                    <p:cond delay="0"/>
+                                  </p:stCondLst>
+                                  <p:childTnLst>
+                                    <p:set>
+                                      <p:cBhvr>
+                                        <p:cTn id="10" dur="1" fill="hold">
+                                          <p:stCondLst>
+                                            <p:cond delay="0"/>
+                                          </p:stCondLst>
+                                        </p:cTn>
+                                        <p:tgtEl>
+                                          <p:spTgt spid="3">
+                                            <p:txEl>
+                                              <p:pRg st="1" end="1"/>
+                                            </p:txEl>
+                                          </p:spTgt>
+                                        </p:tgtEl>
+                                        <p:attrNameLst>
+                                          <p:attrName>style.visibility</p:attrName>
+                                        </p:attrNameLst>
+                                      </p:cBhvr>
+                                      <p:to>
+                                        <p:strVal val="visible"/>
+                                      </p:to>
+                                    </p:set>
+                                  </p:childTnLst>
+                                </p:cTn>
+                              </p:par>
+                            </p:childTnLst>
+                          </p:cTn>
+                        </p:par>
+                      </p:childTnLst>
+                    </p:cTn>
+                  </p:par>
+                  <p:par>
+                    <p:cTn id="11" fill="hold">
+                      <p:stCondLst>
+                        <p:cond delay="indefinite"/>
+                      </p:stCondLst>
+                      <p:childTnLst>
+                        <p:par>
+                          <p:cTn id="12" fill="hold">
+                            <p:stCondLst>
+                              <p:cond delay="0"/>
+                            </p:stCondLst>
+                            <p:childTnLst>
+                              <p:par>
+                                <p:cTn id="13" presetID="1" presetClass="entr" presetSubtype="0" fill="hold" nodeType="clickEffect">
+                                  <p:stCondLst>
+                                    <p:cond delay="0"/>
+                                  </p:stCondLst>
+                                  <p:childTnLst>
+                                    <p:set>
+                                      <p:cBhvr>
+                                        <p:cTn id="14" dur="1" fill="hold">
+                                          <p:stCondLst>
+                                            <p:cond delay="0"/>
+                                          </p:stCondLst>
+                                        </p:cTn>
+                                        <p:tgtEl>
+                                          <p:spTgt spid="3">
+                                            <p:txEl>
+                                              <p:pRg st="2" end="2"/>
+                                            </p:txEl>
+                                          </p:spTgt>
+                                        </p:tgtEl>
+                                        <p:attrNameLst>
+                                          <p:attrName>style.visibility</p:attrName>
+                                        </p:attrNameLst>
+                                      </p:cBhvr>
+                                      <p:to>
+                                        <p:strVal val="visible"/>
+                                      </p:to>
+                                    </p:set>
+                                  </p:childTnLst>
+                                </p:cTn>
+                              </p:par>
+                            </p:childTnLst>
+                          </p:cTn>
+                        </p:par>
+                      </p:childTnLst>
+                    </p:cTn>
+                  </p:par>
+                  <p:par>
+                    <p:cTn id="15" fill="hold">
+                      <p:stCondLst>
+                        <p:cond delay="indefinite"/>
+                      </p:stCondLst>
+                      <p:childTnLst>
+                        <p:par>
+                          <p:cTn id="16" fill="hold">
+                            <p:stCondLst>
+                              <p:cond delay="0"/>
+                            </p:stCondLst>
+                            <p:childTnLst>
+                              <p:par>
+                                <p:cTn id="17" presetID="1" presetClass="entr" presetSubtype="0" fill="hold" nodeType="clickEffect">
+                                  <p:stCondLst>
+                                    <p:cond delay="0"/>
+                                  </p:stCondLst>
+                                  <p:childTnLst>
+                                    <p:set>
+                                      <p:cBhvr>
+                                        <p:cTn id="18" dur="1" fill="hold">
+                                          <p:stCondLst>
+                                            <p:cond delay="0"/>
+                                          </p:stCondLst>
+                                        </p:cTn>
+                                        <p:tgtEl>
+                                          <p:spTgt spid="3">
+                                            <p:txEl>
+                                              <p:pRg st="3" end="3"/>
+                                            </p:txEl>
+                                          </p:spTgt>
+                                        </p:tgtEl>
+                                        <p:attrNameLst>
+                                          <p:attrName>style.visibility</p:attrName>
+                                        </p:attrNameLst>
+                                      </p:cBhvr>
+                                      <p:to>
+                                        <p:strVal val="visible"/>
+                                      </p:to>
+                                    </p:set>
+                                  </p:childTnLst>
+                                </p:cTn>
+                              </p:par>
+                            </p:childTnLst>
+                          </p:cTn>
+                        </p:par>
+                      </p:childTnLst>
+                    </p:cTn>
+                  </p:par>
+                  <p:par>
+                    <p:cTn id="19" fill="hold">
+                      <p:stCondLst>
+                        <p:cond delay="indefinite"/>
+                      </p:stCondLst>
+                      <p:childTnLst>
+                        <p:par>
+                          <p:cTn id="20" fill="hold">
+                            <p:stCondLst>
+                              <p:cond delay="0"/>
+                            </p:stCondLst>
+                            <p:childTnLst>
+                              <p:par>
+                                <p:cTn id="21" presetID="1" presetClass="entr" presetSubtype="0" fill="hold" nodeType="clickEffect">
+                                  <p:stCondLst>
+                                    <p:cond delay="0"/>
+                                  </p:stCondLst>
+                                  <p:childTnLst>
+                                    <p:set>
+                                      <p:cBhvr>
+                                        <p:cTn id="22" dur="1" fill="hold">
+                                          <p:stCondLst>
+                                            <p:cond delay="0"/>
+                                          </p:stCondLst>
+                                        </p:cTn>
+                                        <p:tgtEl>
+                                          <p:spTgt spid="3">
+                                            <p:txEl>
+                                              <p:pRg st="4" end="4"/>
+                                            </p:txEl>
+                                          </p:spTgt>
+                                        </p:tgtEl>
+                                        <p:attrNameLst>
+                                          <p:attrName>style.visibility</p:attrName>
+                                        </p:attrNameLst>
+                                      </p:cBhvr>
+                                      <p:to>
+                                        <p:strVal val="visible"/>
+                                      </p:to>
+                                    </p:set>
+                                  </p:childTnLst>
+                                </p:cTn>
+                              </p:par>
+                            </p:childTnLst>
+                          </p:cTn>
+                        </p:par>
+                      </p:childTnLst>
+                    </p:cTn>
+                  </p:par>
+                </p:childTnLst>
+              </p:cTn>
+              <p:prevCondLst>
+                <p:cond evt="onPrev" delay="0">
+                  <p:tgtEl>
+                    <p:sldTgt/>
+                  </p:tgtEl>
+                </p:cond>
+              </p:prevCondLst>
+              <p:nextCondLst>
+                <p:cond evt="onNext" delay="0">
+                  <p:tgtEl>
+                    <p:sldTgt/>
+                  </p:tgtEl>
+                </p:cond>
+              </p:nextCondLst>
+            </p:seq>
+          </p:childTnLst>
+        </p:cTn>
+      </p:par>
+    </p:tnLst>
+  </p:timing>
 </p:sld>
 </file>
 
@@ -15997,25 +16949,25 @@
           <a:lstStyle/>
           <a:p>
             <a:r>
-              <a:rPr lang="en-US"/>
+              <a:rPr lang="en-US" dirty="0"/>
               <a:t>Surprise, surprise, you can also try fine-tuning a model! What does this mean?</a:t>
             </a:r>
           </a:p>
           <a:p>
             <a:r>
-              <a:rPr lang="en-US"/>
+              <a:rPr lang="en-US" dirty="0"/>
               <a:t>There are people with more machine learning expertise and money than you (no offense) that have trained machine learning models from scratch and uploaded them to the internet–for free!</a:t>
             </a:r>
           </a:p>
           <a:p>
             <a:r>
-              <a:rPr lang="en-US"/>
+              <a:rPr lang="en-US" dirty="0"/>
               <a:t>You can take one of those free models from the internet and adapt it for your research project. </a:t>
             </a:r>
           </a:p>
           <a:p>
             <a:r>
-              <a:rPr lang="en-US"/>
+              <a:rPr lang="en-US" dirty="0"/>
               <a:t>Don't get me wrong—you'll still have to manually label some articles, but less than for training a model from scratch.</a:t>
             </a:r>
           </a:p>
@@ -16031,6 +16983,232 @@
   <p:clrMapOvr>
     <a:masterClrMapping/>
   </p:clrMapOvr>
+  <p:timing>
+    <p:tnLst>
+      <p:par>
+        <p:cTn id="1" dur="indefinite" restart="never" nodeType="tmRoot">
+          <p:childTnLst>
+            <p:seq concurrent="1" nextAc="seek">
+              <p:cTn id="2" dur="indefinite" nodeType="mainSeq">
+                <p:childTnLst>
+                  <p:par>
+                    <p:cTn id="3" fill="hold">
+                      <p:stCondLst>
+                        <p:cond delay="indefinite"/>
+                      </p:stCondLst>
+                      <p:childTnLst>
+                        <p:par>
+                          <p:cTn id="4" fill="hold">
+                            <p:stCondLst>
+                              <p:cond delay="0"/>
+                            </p:stCondLst>
+                            <p:childTnLst>
+                              <p:par>
+                                <p:cTn id="5" presetID="1" presetClass="entr" presetSubtype="0" fill="hold" nodeType="clickEffect">
+                                  <p:stCondLst>
+                                    <p:cond delay="0"/>
+                                  </p:stCondLst>
+                                  <p:childTnLst>
+                                    <p:set>
+                                      <p:cBhvr>
+                                        <p:cTn id="6" dur="1" fill="hold">
+                                          <p:stCondLst>
+                                            <p:cond delay="0"/>
+                                          </p:stCondLst>
+                                        </p:cTn>
+                                        <p:tgtEl>
+                                          <p:spTgt spid="3">
+                                            <p:txEl>
+                                              <p:pRg st="0" end="0"/>
+                                            </p:txEl>
+                                          </p:spTgt>
+                                        </p:tgtEl>
+                                        <p:attrNameLst>
+                                          <p:attrName>style.visibility</p:attrName>
+                                        </p:attrNameLst>
+                                      </p:cBhvr>
+                                      <p:to>
+                                        <p:strVal val="visible"/>
+                                      </p:to>
+                                    </p:set>
+                                  </p:childTnLst>
+                                </p:cTn>
+                              </p:par>
+                            </p:childTnLst>
+                          </p:cTn>
+                        </p:par>
+                      </p:childTnLst>
+                    </p:cTn>
+                  </p:par>
+                  <p:par>
+                    <p:cTn id="7" fill="hold">
+                      <p:stCondLst>
+                        <p:cond delay="indefinite"/>
+                      </p:stCondLst>
+                      <p:childTnLst>
+                        <p:par>
+                          <p:cTn id="8" fill="hold">
+                            <p:stCondLst>
+                              <p:cond delay="0"/>
+                            </p:stCondLst>
+                            <p:childTnLst>
+                              <p:par>
+                                <p:cTn id="9" presetID="1" presetClass="entr" presetSubtype="0" fill="hold" nodeType="clickEffect">
+                                  <p:stCondLst>
+                                    <p:cond delay="0"/>
+                                  </p:stCondLst>
+                                  <p:childTnLst>
+                                    <p:set>
+                                      <p:cBhvr>
+                                        <p:cTn id="10" dur="1" fill="hold">
+                                          <p:stCondLst>
+                                            <p:cond delay="0"/>
+                                          </p:stCondLst>
+                                        </p:cTn>
+                                        <p:tgtEl>
+                                          <p:spTgt spid="3">
+                                            <p:txEl>
+                                              <p:pRg st="1" end="1"/>
+                                            </p:txEl>
+                                          </p:spTgt>
+                                        </p:tgtEl>
+                                        <p:attrNameLst>
+                                          <p:attrName>style.visibility</p:attrName>
+                                        </p:attrNameLst>
+                                      </p:cBhvr>
+                                      <p:to>
+                                        <p:strVal val="visible"/>
+                                      </p:to>
+                                    </p:set>
+                                  </p:childTnLst>
+                                </p:cTn>
+                              </p:par>
+                            </p:childTnLst>
+                          </p:cTn>
+                        </p:par>
+                      </p:childTnLst>
+                    </p:cTn>
+                  </p:par>
+                  <p:par>
+                    <p:cTn id="11" fill="hold">
+                      <p:stCondLst>
+                        <p:cond delay="indefinite"/>
+                      </p:stCondLst>
+                      <p:childTnLst>
+                        <p:par>
+                          <p:cTn id="12" fill="hold">
+                            <p:stCondLst>
+                              <p:cond delay="0"/>
+                            </p:stCondLst>
+                            <p:childTnLst>
+                              <p:par>
+                                <p:cTn id="13" presetID="1" presetClass="entr" presetSubtype="0" fill="hold" nodeType="clickEffect">
+                                  <p:stCondLst>
+                                    <p:cond delay="0"/>
+                                  </p:stCondLst>
+                                  <p:childTnLst>
+                                    <p:set>
+                                      <p:cBhvr>
+                                        <p:cTn id="14" dur="1" fill="hold">
+                                          <p:stCondLst>
+                                            <p:cond delay="0"/>
+                                          </p:stCondLst>
+                                        </p:cTn>
+                                        <p:tgtEl>
+                                          <p:spTgt spid="3">
+                                            <p:txEl>
+                                              <p:pRg st="2" end="2"/>
+                                            </p:txEl>
+                                          </p:spTgt>
+                                        </p:tgtEl>
+                                        <p:attrNameLst>
+                                          <p:attrName>style.visibility</p:attrName>
+                                        </p:attrNameLst>
+                                      </p:cBhvr>
+                                      <p:to>
+                                        <p:strVal val="visible"/>
+                                      </p:to>
+                                    </p:set>
+                                  </p:childTnLst>
+                                </p:cTn>
+                              </p:par>
+                            </p:childTnLst>
+                          </p:cTn>
+                        </p:par>
+                      </p:childTnLst>
+                    </p:cTn>
+                  </p:par>
+                  <p:par>
+                    <p:cTn id="15" fill="hold">
+                      <p:stCondLst>
+                        <p:cond delay="indefinite"/>
+                      </p:stCondLst>
+                      <p:childTnLst>
+                        <p:par>
+                          <p:cTn id="16" fill="hold">
+                            <p:stCondLst>
+                              <p:cond delay="0"/>
+                            </p:stCondLst>
+                            <p:childTnLst>
+                              <p:par>
+                                <p:cTn id="17" presetID="1" presetClass="entr" presetSubtype="0" fill="hold" nodeType="clickEffect">
+                                  <p:stCondLst>
+                                    <p:cond delay="0"/>
+                                  </p:stCondLst>
+                                  <p:childTnLst>
+                                    <p:set>
+                                      <p:cBhvr>
+                                        <p:cTn id="18" dur="1" fill="hold">
+                                          <p:stCondLst>
+                                            <p:cond delay="0"/>
+                                          </p:stCondLst>
+                                        </p:cTn>
+                                        <p:tgtEl>
+                                          <p:spTgt spid="3">
+                                            <p:txEl>
+                                              <p:pRg st="3" end="3"/>
+                                            </p:txEl>
+                                          </p:spTgt>
+                                        </p:tgtEl>
+                                        <p:attrNameLst>
+                                          <p:attrName>style.visibility</p:attrName>
+                                        </p:attrNameLst>
+                                      </p:cBhvr>
+                                      <p:to>
+                                        <p:strVal val="visible"/>
+                                      </p:to>
+                                    </p:set>
+                                  </p:childTnLst>
+                                </p:cTn>
+                              </p:par>
+                            </p:childTnLst>
+                          </p:cTn>
+                        </p:par>
+                      </p:childTnLst>
+                    </p:cTn>
+                  </p:par>
+                </p:childTnLst>
+              </p:cTn>
+              <p:prevCondLst>
+                <p:cond evt="onPrev" delay="0">
+                  <p:tgtEl>
+                    <p:sldTgt/>
+                  </p:tgtEl>
+                </p:cond>
+              </p:prevCondLst>
+              <p:nextCondLst>
+                <p:cond evt="onNext" delay="0">
+                  <p:tgtEl>
+                    <p:sldTgt/>
+                  </p:tgtEl>
+                </p:cond>
+              </p:nextCondLst>
+            </p:seq>
+          </p:childTnLst>
+        </p:cTn>
+      </p:par>
+    </p:tnLst>
+  </p:timing>
 </p:sld>
 </file>
 
@@ -16103,7 +17281,7 @@
           <a:lstStyle/>
           <a:p>
             <a:r>
-              <a:rPr lang="en-US"/>
+              <a:rPr lang="en-US" dirty="0"/>
               <a:t>Fine-tuning  consists of taking an existing model (a "pretrained model") and adapting it for your task.</a:t>
             </a:r>
           </a:p>
@@ -16111,7 +17289,7 @@
             <a:pPr marL="0" indent="0">
               <a:buNone/>
             </a:pPr>
-            <a:endParaRPr lang="en-US"/>
+            <a:endParaRPr lang="en-US" dirty="0"/>
           </a:p>
         </p:txBody>
       </p:sp>
@@ -16155,6 +17333,81 @@
   <p:clrMapOvr>
     <a:masterClrMapping/>
   </p:clrMapOvr>
+  <p:timing>
+    <p:tnLst>
+      <p:par>
+        <p:cTn id="1" dur="indefinite" restart="never" nodeType="tmRoot">
+          <p:childTnLst>
+            <p:seq concurrent="1" nextAc="seek">
+              <p:cTn id="2" dur="indefinite" nodeType="mainSeq">
+                <p:childTnLst>
+                  <p:par>
+                    <p:cTn id="3" fill="hold">
+                      <p:stCondLst>
+                        <p:cond delay="indefinite"/>
+                      </p:stCondLst>
+                      <p:childTnLst>
+                        <p:par>
+                          <p:cTn id="4" fill="hold">
+                            <p:stCondLst>
+                              <p:cond delay="0"/>
+                            </p:stCondLst>
+                            <p:childTnLst>
+                              <p:par>
+                                <p:cTn id="5" presetID="1" presetClass="entr" presetSubtype="0" fill="hold" nodeType="clickEffect">
+                                  <p:stCondLst>
+                                    <p:cond delay="0"/>
+                                  </p:stCondLst>
+                                  <p:childTnLst>
+                                    <p:set>
+                                      <p:cBhvr>
+                                        <p:cTn id="6" dur="1" fill="hold">
+                                          <p:stCondLst>
+                                            <p:cond delay="0"/>
+                                          </p:stCondLst>
+                                        </p:cTn>
+                                        <p:tgtEl>
+                                          <p:spTgt spid="4"/>
+                                        </p:tgtEl>
+                                        <p:attrNameLst>
+                                          <p:attrName>style.visibility</p:attrName>
+                                        </p:attrNameLst>
+                                      </p:cBhvr>
+                                      <p:to>
+                                        <p:strVal val="visible"/>
+                                      </p:to>
+                                    </p:set>
+                                  </p:childTnLst>
+                                </p:cTn>
+                              </p:par>
+                            </p:childTnLst>
+                          </p:cTn>
+                        </p:par>
+                      </p:childTnLst>
+                    </p:cTn>
+                  </p:par>
+                </p:childTnLst>
+              </p:cTn>
+              <p:prevCondLst>
+                <p:cond evt="onPrev" delay="0">
+                  <p:tgtEl>
+                    <p:sldTgt/>
+                  </p:tgtEl>
+                </p:cond>
+              </p:prevCondLst>
+              <p:nextCondLst>
+                <p:cond evt="onNext" delay="0">
+                  <p:tgtEl>
+                    <p:sldTgt/>
+                  </p:tgtEl>
+                </p:cond>
+              </p:nextCondLst>
+            </p:seq>
+          </p:childTnLst>
+        </p:cTn>
+      </p:par>
+    </p:tnLst>
+  </p:timing>
 </p:sld>
 </file>
 
@@ -16227,49 +17480,49 @@
           <a:lstStyle/>
           <a:p>
             <a:r>
-              <a:rPr lang="en-US"/>
+              <a:rPr lang="en-US" dirty="0"/>
               <a:t>Today we're focusing on fine-tuning a specific type of models for text classification.</a:t>
             </a:r>
           </a:p>
           <a:p>
             <a:r>
-              <a:rPr lang="en-US"/>
+              <a:rPr lang="en-US" dirty="0"/>
               <a:t>Even then, this workshop could be a whole course. While we don't have time to cover everything in detail, there are appendix slides with more detail. </a:t>
             </a:r>
           </a:p>
           <a:p>
             <a:r>
-              <a:rPr lang="en-US"/>
+              <a:rPr lang="en-US" dirty="0"/>
               <a:t>This is a practical, not a theoretical workshop.</a:t>
             </a:r>
           </a:p>
           <a:p>
             <a:r>
-              <a:rPr lang="en-US"/>
+              <a:rPr lang="en-US" dirty="0"/>
               <a:t>There are aspects that need to be considered on a case-by-case basis.</a:t>
             </a:r>
           </a:p>
           <a:p>
             <a:r>
-              <a:rPr lang="en-US"/>
+              <a:rPr lang="en-US" dirty="0"/>
               <a:t>Ambiguous [</a:t>
             </a:r>
             <a:r>
-              <a:rPr lang="en-US" i="1"/>
+              <a:rPr lang="en-US" i="1" dirty="0"/>
               <a:t>terms</a:t>
             </a:r>
             <a:r>
-              <a:rPr lang="en-US"/>
+              <a:rPr lang="en-US" dirty="0"/>
               <a:t>] are bracketed and in italics, signaling that there is more detail in the appendix slides.</a:t>
             </a:r>
           </a:p>
           <a:p>
             <a:r>
-              <a:rPr lang="en-US"/>
+              <a:rPr lang="en-US" dirty="0"/>
               <a:t>You're always welcome to submit a free consult request with us at </a:t>
             </a:r>
             <a:r>
-              <a:rPr lang="en-US" b="1">
+              <a:rPr lang="en-US" b="1" dirty="0">
                 <a:solidFill>
                   <a:srgbClr val="7030A0"/>
                 </a:solidFill>
@@ -16283,14 +17536,14 @@
               </a:rPr>
               <a:t>bit.ly/rcdsconsult</a:t>
             </a:r>
-            <a:endParaRPr lang="en-US" b="1">
+            <a:endParaRPr lang="en-US" b="1" dirty="0">
               <a:solidFill>
                 <a:srgbClr val="7030A0"/>
               </a:solidFill>
             </a:endParaRPr>
           </a:p>
           <a:p>
-            <a:endParaRPr lang="en-US"/>
+            <a:endParaRPr lang="en-US" dirty="0"/>
           </a:p>
         </p:txBody>
       </p:sp>
@@ -16304,6 +17557,330 @@
   <p:clrMapOvr>
     <a:masterClrMapping/>
   </p:clrMapOvr>
+  <p:timing>
+    <p:tnLst>
+      <p:par>
+        <p:cTn id="1" dur="indefinite" restart="never" nodeType="tmRoot">
+          <p:childTnLst>
+            <p:seq concurrent="1" nextAc="seek">
+              <p:cTn id="2" dur="indefinite" nodeType="mainSeq">
+                <p:childTnLst>
+                  <p:par>
+                    <p:cTn id="3" fill="hold">
+                      <p:stCondLst>
+                        <p:cond delay="indefinite"/>
+                      </p:stCondLst>
+                      <p:childTnLst>
+                        <p:par>
+                          <p:cTn id="4" fill="hold">
+                            <p:stCondLst>
+                              <p:cond delay="0"/>
+                            </p:stCondLst>
+                            <p:childTnLst>
+                              <p:par>
+                                <p:cTn id="5" presetID="1" presetClass="entr" presetSubtype="0" fill="hold" nodeType="clickEffect">
+                                  <p:stCondLst>
+                                    <p:cond delay="0"/>
+                                  </p:stCondLst>
+                                  <p:childTnLst>
+                                    <p:set>
+                                      <p:cBhvr>
+                                        <p:cTn id="6" dur="1" fill="hold">
+                                          <p:stCondLst>
+                                            <p:cond delay="0"/>
+                                          </p:stCondLst>
+                                        </p:cTn>
+                                        <p:tgtEl>
+                                          <p:spTgt spid="3">
+                                            <p:txEl>
+                                              <p:pRg st="0" end="0"/>
+                                            </p:txEl>
+                                          </p:spTgt>
+                                        </p:tgtEl>
+                                        <p:attrNameLst>
+                                          <p:attrName>style.visibility</p:attrName>
+                                        </p:attrNameLst>
+                                      </p:cBhvr>
+                                      <p:to>
+                                        <p:strVal val="visible"/>
+                                      </p:to>
+                                    </p:set>
+                                  </p:childTnLst>
+                                </p:cTn>
+                              </p:par>
+                            </p:childTnLst>
+                          </p:cTn>
+                        </p:par>
+                      </p:childTnLst>
+                    </p:cTn>
+                  </p:par>
+                  <p:par>
+                    <p:cTn id="7" fill="hold">
+                      <p:stCondLst>
+                        <p:cond delay="indefinite"/>
+                      </p:stCondLst>
+                      <p:childTnLst>
+                        <p:par>
+                          <p:cTn id="8" fill="hold">
+                            <p:stCondLst>
+                              <p:cond delay="0"/>
+                            </p:stCondLst>
+                            <p:childTnLst>
+                              <p:par>
+                                <p:cTn id="9" presetID="1" presetClass="entr" presetSubtype="0" fill="hold" nodeType="clickEffect">
+                                  <p:stCondLst>
+                                    <p:cond delay="0"/>
+                                  </p:stCondLst>
+                                  <p:childTnLst>
+                                    <p:set>
+                                      <p:cBhvr>
+                                        <p:cTn id="10" dur="1" fill="hold">
+                                          <p:stCondLst>
+                                            <p:cond delay="0"/>
+                                          </p:stCondLst>
+                                        </p:cTn>
+                                        <p:tgtEl>
+                                          <p:spTgt spid="3">
+                                            <p:txEl>
+                                              <p:pRg st="1" end="1"/>
+                                            </p:txEl>
+                                          </p:spTgt>
+                                        </p:tgtEl>
+                                        <p:attrNameLst>
+                                          <p:attrName>style.visibility</p:attrName>
+                                        </p:attrNameLst>
+                                      </p:cBhvr>
+                                      <p:to>
+                                        <p:strVal val="visible"/>
+                                      </p:to>
+                                    </p:set>
+                                  </p:childTnLst>
+                                </p:cTn>
+                              </p:par>
+                            </p:childTnLst>
+                          </p:cTn>
+                        </p:par>
+                      </p:childTnLst>
+                    </p:cTn>
+                  </p:par>
+                  <p:par>
+                    <p:cTn id="11" fill="hold">
+                      <p:stCondLst>
+                        <p:cond delay="indefinite"/>
+                      </p:stCondLst>
+                      <p:childTnLst>
+                        <p:par>
+                          <p:cTn id="12" fill="hold">
+                            <p:stCondLst>
+                              <p:cond delay="0"/>
+                            </p:stCondLst>
+                            <p:childTnLst>
+                              <p:par>
+                                <p:cTn id="13" presetID="1" presetClass="entr" presetSubtype="0" fill="hold" nodeType="clickEffect">
+                                  <p:stCondLst>
+                                    <p:cond delay="0"/>
+                                  </p:stCondLst>
+                                  <p:childTnLst>
+                                    <p:set>
+                                      <p:cBhvr>
+                                        <p:cTn id="14" dur="1" fill="hold">
+                                          <p:stCondLst>
+                                            <p:cond delay="0"/>
+                                          </p:stCondLst>
+                                        </p:cTn>
+                                        <p:tgtEl>
+                                          <p:spTgt spid="3">
+                                            <p:txEl>
+                                              <p:pRg st="2" end="2"/>
+                                            </p:txEl>
+                                          </p:spTgt>
+                                        </p:tgtEl>
+                                        <p:attrNameLst>
+                                          <p:attrName>style.visibility</p:attrName>
+                                        </p:attrNameLst>
+                                      </p:cBhvr>
+                                      <p:to>
+                                        <p:strVal val="visible"/>
+                                      </p:to>
+                                    </p:set>
+                                  </p:childTnLst>
+                                </p:cTn>
+                              </p:par>
+                            </p:childTnLst>
+                          </p:cTn>
+                        </p:par>
+                      </p:childTnLst>
+                    </p:cTn>
+                  </p:par>
+                  <p:par>
+                    <p:cTn id="15" fill="hold">
+                      <p:stCondLst>
+                        <p:cond delay="indefinite"/>
+                      </p:stCondLst>
+                      <p:childTnLst>
+                        <p:par>
+                          <p:cTn id="16" fill="hold">
+                            <p:stCondLst>
+                              <p:cond delay="0"/>
+                            </p:stCondLst>
+                            <p:childTnLst>
+                              <p:par>
+                                <p:cTn id="17" presetID="1" presetClass="entr" presetSubtype="0" fill="hold" nodeType="clickEffect">
+                                  <p:stCondLst>
+                                    <p:cond delay="0"/>
+                                  </p:stCondLst>
+                                  <p:childTnLst>
+                                    <p:set>
+                                      <p:cBhvr>
+                                        <p:cTn id="18" dur="1" fill="hold">
+                                          <p:stCondLst>
+                                            <p:cond delay="0"/>
+                                          </p:stCondLst>
+                                        </p:cTn>
+                                        <p:tgtEl>
+                                          <p:spTgt spid="3">
+                                            <p:txEl>
+                                              <p:pRg st="3" end="3"/>
+                                            </p:txEl>
+                                          </p:spTgt>
+                                        </p:tgtEl>
+                                        <p:attrNameLst>
+                                          <p:attrName>style.visibility</p:attrName>
+                                        </p:attrNameLst>
+                                      </p:cBhvr>
+                                      <p:to>
+                                        <p:strVal val="visible"/>
+                                      </p:to>
+                                    </p:set>
+                                  </p:childTnLst>
+                                </p:cTn>
+                              </p:par>
+                            </p:childTnLst>
+                          </p:cTn>
+                        </p:par>
+                      </p:childTnLst>
+                    </p:cTn>
+                  </p:par>
+                  <p:par>
+                    <p:cTn id="19" fill="hold">
+                      <p:stCondLst>
+                        <p:cond delay="indefinite"/>
+                      </p:stCondLst>
+                      <p:childTnLst>
+                        <p:par>
+                          <p:cTn id="20" fill="hold">
+                            <p:stCondLst>
+                              <p:cond delay="0"/>
+                            </p:stCondLst>
+                            <p:childTnLst>
+                              <p:par>
+                                <p:cTn id="21" presetID="1" presetClass="entr" presetSubtype="0" fill="hold" nodeType="clickEffect">
+                                  <p:stCondLst>
+                                    <p:cond delay="0"/>
+                                  </p:stCondLst>
+                                  <p:childTnLst>
+                                    <p:set>
+                                      <p:cBhvr>
+                                        <p:cTn id="22" dur="1" fill="hold">
+                                          <p:stCondLst>
+                                            <p:cond delay="0"/>
+                                          </p:stCondLst>
+                                        </p:cTn>
+                                        <p:tgtEl>
+                                          <p:spTgt spid="3">
+                                            <p:txEl>
+                                              <p:pRg st="4" end="4"/>
+                                            </p:txEl>
+                                          </p:spTgt>
+                                        </p:tgtEl>
+                                        <p:attrNameLst>
+                                          <p:attrName>style.visibility</p:attrName>
+                                        </p:attrNameLst>
+                                      </p:cBhvr>
+                                      <p:to>
+                                        <p:strVal val="visible"/>
+                                      </p:to>
+                                    </p:set>
+                                  </p:childTnLst>
+                                </p:cTn>
+                              </p:par>
+                            </p:childTnLst>
+                          </p:cTn>
+                        </p:par>
+                      </p:childTnLst>
+                    </p:cTn>
+                  </p:par>
+                  <p:par>
+                    <p:cTn id="23" fill="hold">
+                      <p:stCondLst>
+                        <p:cond delay="indefinite"/>
+                      </p:stCondLst>
+                      <p:childTnLst>
+                        <p:par>
+                          <p:cTn id="24" fill="hold">
+                            <p:stCondLst>
+                              <p:cond delay="0"/>
+                            </p:stCondLst>
+                            <p:childTnLst>
+                              <p:par>
+                                <p:cTn id="25" presetID="1" presetClass="entr" presetSubtype="0" fill="hold" nodeType="clickEffect">
+                                  <p:stCondLst>
+                                    <p:cond delay="0"/>
+                                  </p:stCondLst>
+                                  <p:childTnLst>
+                                    <p:set>
+                                      <p:cBhvr>
+                                        <p:cTn id="26" dur="1" fill="hold">
+                                          <p:stCondLst>
+                                            <p:cond delay="0"/>
+                                          </p:stCondLst>
+                                        </p:cTn>
+                                        <p:tgtEl>
+                                          <p:spTgt spid="3">
+                                            <p:txEl>
+                                              <p:pRg st="5" end="5"/>
+                                            </p:txEl>
+                                          </p:spTgt>
+                                        </p:tgtEl>
+                                        <p:attrNameLst>
+                                          <p:attrName>style.visibility</p:attrName>
+                                        </p:attrNameLst>
+                                      </p:cBhvr>
+                                      <p:to>
+                                        <p:strVal val="visible"/>
+                                      </p:to>
+                                    </p:set>
+                                  </p:childTnLst>
+                                </p:cTn>
+                              </p:par>
+                            </p:childTnLst>
+                          </p:cTn>
+                        </p:par>
+                      </p:childTnLst>
+                    </p:cTn>
+                  </p:par>
+                </p:childTnLst>
+              </p:cTn>
+              <p:prevCondLst>
+                <p:cond evt="onPrev" delay="0">
+                  <p:tgtEl>
+                    <p:sldTgt/>
+                  </p:tgtEl>
+                </p:cond>
+              </p:prevCondLst>
+              <p:nextCondLst>
+                <p:cond evt="onNext" delay="0">
+                  <p:tgtEl>
+                    <p:sldTgt/>
+                  </p:tgtEl>
+                </p:cond>
+              </p:nextCondLst>
+            </p:seq>
+          </p:childTnLst>
+        </p:cTn>
+      </p:par>
+    </p:tnLst>
+  </p:timing>
 </p:sld>
 </file>
 
@@ -16382,31 +17959,31 @@
           <a:lstStyle/>
           <a:p>
             <a:r>
-              <a:rPr lang="en-US"/>
+              <a:rPr lang="en-US" dirty="0"/>
               <a:t>Erhard et al (2025) fine-tuned </a:t>
             </a:r>
             <a:r>
-              <a:rPr lang="en-US" err="1"/>
+              <a:rPr lang="en-US" dirty="0" err="1"/>
               <a:t>GBERT</a:t>
             </a:r>
             <a:r>
-              <a:rPr lang="en-US" baseline="-25000" err="1"/>
+              <a:rPr lang="en-US" baseline="-25000" dirty="0" err="1"/>
               <a:t>Large</a:t>
             </a:r>
             <a:r>
-              <a:rPr lang="en-US"/>
+              <a:rPr lang="en-US" dirty="0"/>
               <a:t> to detect and quantify left-wing and right-wing and anti-elitist and people-centric instances of populist discourse in Germany. </a:t>
             </a:r>
           </a:p>
           <a:p>
             <a:r>
-              <a:rPr lang="en-US"/>
+              <a:rPr lang="en-US" dirty="0"/>
               <a:t>This allows them to analyze the prevalence of populist language in the German Bundestag and its breakdown across political parties. </a:t>
             </a:r>
           </a:p>
           <a:p>
             <a:r>
-              <a:rPr lang="en-US"/>
+              <a:rPr lang="en-US" dirty="0"/>
               <a:t>More generally, the fine-tuned model can help to identify rhetorical  patterns, contextual factors, or temporal dynamics underlying populist language and to examine how populists frame their messages and which social, economic, or cultural issues they emphasize. </a:t>
             </a:r>
           </a:p>
@@ -16422,6 +17999,134 @@
   <p:clrMapOvr>
     <a:masterClrMapping/>
   </p:clrMapOvr>
+  <p:timing>
+    <p:tnLst>
+      <p:par>
+        <p:cTn id="1" dur="indefinite" restart="never" nodeType="tmRoot">
+          <p:childTnLst>
+            <p:seq concurrent="1" nextAc="seek">
+              <p:cTn id="2" dur="indefinite" nodeType="mainSeq">
+                <p:childTnLst>
+                  <p:par>
+                    <p:cTn id="3" fill="hold">
+                      <p:stCondLst>
+                        <p:cond delay="indefinite"/>
+                      </p:stCondLst>
+                      <p:childTnLst>
+                        <p:par>
+                          <p:cTn id="4" fill="hold">
+                            <p:stCondLst>
+                              <p:cond delay="0"/>
+                            </p:stCondLst>
+                            <p:childTnLst>
+                              <p:par>
+                                <p:cTn id="5" presetID="1" presetClass="entr" presetSubtype="0" fill="hold" nodeType="clickEffect">
+                                  <p:stCondLst>
+                                    <p:cond delay="0"/>
+                                  </p:stCondLst>
+                                  <p:childTnLst>
+                                    <p:set>
+                                      <p:cBhvr>
+                                        <p:cTn id="6" dur="1" fill="hold">
+                                          <p:stCondLst>
+                                            <p:cond delay="0"/>
+                                          </p:stCondLst>
+                                        </p:cTn>
+                                        <p:tgtEl>
+                                          <p:spTgt spid="3">
+                                            <p:txEl>
+                                              <p:pRg st="1" end="1"/>
+                                            </p:txEl>
+                                          </p:spTgt>
+                                        </p:tgtEl>
+                                        <p:attrNameLst>
+                                          <p:attrName>style.visibility</p:attrName>
+                                        </p:attrNameLst>
+                                      </p:cBhvr>
+                                      <p:to>
+                                        <p:strVal val="visible"/>
+                                      </p:to>
+                                    </p:set>
+                                  </p:childTnLst>
+                                </p:cTn>
+                              </p:par>
+                            </p:childTnLst>
+                          </p:cTn>
+                        </p:par>
+                      </p:childTnLst>
+                    </p:cTn>
+                  </p:par>
+                  <p:par>
+                    <p:cTn id="7" fill="hold">
+                      <p:stCondLst>
+                        <p:cond delay="indefinite"/>
+                      </p:stCondLst>
+                      <p:childTnLst>
+                        <p:par>
+                          <p:cTn id="8" fill="hold">
+                            <p:stCondLst>
+                              <p:cond delay="0"/>
+                            </p:stCondLst>
+                            <p:childTnLst>
+                              <p:par>
+                                <p:cTn id="9" presetID="1" presetClass="entr" presetSubtype="0" fill="hold" nodeType="clickEffect">
+                                  <p:stCondLst>
+                                    <p:cond delay="0"/>
+                                  </p:stCondLst>
+                                  <p:childTnLst>
+                                    <p:set>
+                                      <p:cBhvr>
+                                        <p:cTn id="10" dur="1" fill="hold">
+                                          <p:stCondLst>
+                                            <p:cond delay="0"/>
+                                          </p:stCondLst>
+                                        </p:cTn>
+                                        <p:tgtEl>
+                                          <p:spTgt spid="3">
+                                            <p:txEl>
+                                              <p:pRg st="2" end="2"/>
+                                            </p:txEl>
+                                          </p:spTgt>
+                                        </p:tgtEl>
+                                        <p:attrNameLst>
+                                          <p:attrName>style.visibility</p:attrName>
+                                        </p:attrNameLst>
+                                      </p:cBhvr>
+                                      <p:to>
+                                        <p:strVal val="visible"/>
+                                      </p:to>
+                                    </p:set>
+                                  </p:childTnLst>
+                                </p:cTn>
+                              </p:par>
+                            </p:childTnLst>
+                          </p:cTn>
+                        </p:par>
+                      </p:childTnLst>
+                    </p:cTn>
+                  </p:par>
+                </p:childTnLst>
+              </p:cTn>
+              <p:prevCondLst>
+                <p:cond evt="onPrev" delay="0">
+                  <p:tgtEl>
+                    <p:sldTgt/>
+                  </p:tgtEl>
+                </p:cond>
+              </p:prevCondLst>
+              <p:nextCondLst>
+                <p:cond evt="onNext" delay="0">
+                  <p:tgtEl>
+                    <p:sldTgt/>
+                  </p:tgtEl>
+                </p:cond>
+              </p:nextCondLst>
+            </p:seq>
+          </p:childTnLst>
+        </p:cTn>
+      </p:par>
+    </p:tnLst>
+  </p:timing>
 </p:sld>
 </file>
 
@@ -16500,43 +18205,43 @@
           <a:lstStyle/>
           <a:p>
             <a:r>
-              <a:rPr lang="en-US"/>
+              <a:rPr lang="en-US" dirty="0"/>
               <a:t>Adapting a pretrained model for your task requires [</a:t>
             </a:r>
             <a:r>
-              <a:rPr lang="en-US" i="1"/>
+              <a:rPr lang="en-US" i="1" dirty="0"/>
               <a:t>less</a:t>
             </a:r>
             <a:r>
-              <a:rPr lang="en-US"/>
+              <a:rPr lang="en-US" dirty="0"/>
               <a:t>] training data than training a model from scratch.</a:t>
             </a:r>
           </a:p>
           <a:p>
             <a:r>
-              <a:rPr lang="en-US"/>
+              <a:rPr lang="en-US" dirty="0"/>
               <a:t>You can get pretty accurate labels even if you don't have the money to annotate [</a:t>
             </a:r>
             <a:r>
-              <a:rPr lang="en-US" i="1"/>
+              <a:rPr lang="en-US" i="1" dirty="0"/>
               <a:t>large amounts</a:t>
             </a:r>
             <a:r>
-              <a:rPr lang="en-US"/>
+              <a:rPr lang="en-US" dirty="0"/>
               <a:t>] of data or are interested in specific domains in which only small corpora exist.</a:t>
             </a:r>
           </a:p>
           <a:p>
             <a:r>
-              <a:rPr lang="en-US"/>
+              <a:rPr lang="en-US" dirty="0"/>
               <a:t>It's a competitive alternative to [</a:t>
             </a:r>
             <a:r>
-              <a:rPr lang="en-US" i="1"/>
+              <a:rPr lang="en-US" i="1" dirty="0"/>
               <a:t>gigantic</a:t>
             </a:r>
             <a:r>
-              <a:rPr lang="en-US"/>
+              <a:rPr lang="en-US" dirty="0"/>
               <a:t>] models such as the ones behind ChatGPT at a lower cost and with more reliability and reproducibility.</a:t>
             </a:r>
           </a:p>
@@ -16552,6 +18257,183 @@
   <p:clrMapOvr>
     <a:masterClrMapping/>
   </p:clrMapOvr>
+  <p:timing>
+    <p:tnLst>
+      <p:par>
+        <p:cTn id="1" dur="indefinite" restart="never" nodeType="tmRoot">
+          <p:childTnLst>
+            <p:seq concurrent="1" nextAc="seek">
+              <p:cTn id="2" dur="indefinite" nodeType="mainSeq">
+                <p:childTnLst>
+                  <p:par>
+                    <p:cTn id="3" fill="hold">
+                      <p:stCondLst>
+                        <p:cond delay="indefinite"/>
+                      </p:stCondLst>
+                      <p:childTnLst>
+                        <p:par>
+                          <p:cTn id="4" fill="hold">
+                            <p:stCondLst>
+                              <p:cond delay="0"/>
+                            </p:stCondLst>
+                            <p:childTnLst>
+                              <p:par>
+                                <p:cTn id="5" presetID="1" presetClass="entr" presetSubtype="0" fill="hold" nodeType="clickEffect">
+                                  <p:stCondLst>
+                                    <p:cond delay="0"/>
+                                  </p:stCondLst>
+                                  <p:childTnLst>
+                                    <p:set>
+                                      <p:cBhvr>
+                                        <p:cTn id="6" dur="1" fill="hold">
+                                          <p:stCondLst>
+                                            <p:cond delay="0"/>
+                                          </p:stCondLst>
+                                        </p:cTn>
+                                        <p:tgtEl>
+                                          <p:spTgt spid="3">
+                                            <p:txEl>
+                                              <p:pRg st="0" end="0"/>
+                                            </p:txEl>
+                                          </p:spTgt>
+                                        </p:tgtEl>
+                                        <p:attrNameLst>
+                                          <p:attrName>style.visibility</p:attrName>
+                                        </p:attrNameLst>
+                                      </p:cBhvr>
+                                      <p:to>
+                                        <p:strVal val="visible"/>
+                                      </p:to>
+                                    </p:set>
+                                  </p:childTnLst>
+                                </p:cTn>
+                              </p:par>
+                            </p:childTnLst>
+                          </p:cTn>
+                        </p:par>
+                      </p:childTnLst>
+                    </p:cTn>
+                  </p:par>
+                  <p:par>
+                    <p:cTn id="7" fill="hold">
+                      <p:stCondLst>
+                        <p:cond delay="indefinite"/>
+                      </p:stCondLst>
+                      <p:childTnLst>
+                        <p:par>
+                          <p:cTn id="8" fill="hold">
+                            <p:stCondLst>
+                              <p:cond delay="0"/>
+                            </p:stCondLst>
+                            <p:childTnLst>
+                              <p:par>
+                                <p:cTn id="9" presetID="1" presetClass="entr" presetSubtype="0" fill="hold" nodeType="clickEffect">
+                                  <p:stCondLst>
+                                    <p:cond delay="0"/>
+                                  </p:stCondLst>
+                                  <p:childTnLst>
+                                    <p:set>
+                                      <p:cBhvr>
+                                        <p:cTn id="10" dur="1" fill="hold">
+                                          <p:stCondLst>
+                                            <p:cond delay="0"/>
+                                          </p:stCondLst>
+                                        </p:cTn>
+                                        <p:tgtEl>
+                                          <p:spTgt spid="3">
+                                            <p:txEl>
+                                              <p:pRg st="1" end="1"/>
+                                            </p:txEl>
+                                          </p:spTgt>
+                                        </p:tgtEl>
+                                        <p:attrNameLst>
+                                          <p:attrName>style.visibility</p:attrName>
+                                        </p:attrNameLst>
+                                      </p:cBhvr>
+                                      <p:to>
+                                        <p:strVal val="visible"/>
+                                      </p:to>
+                                    </p:set>
+                                  </p:childTnLst>
+                                </p:cTn>
+                              </p:par>
+                            </p:childTnLst>
+                          </p:cTn>
+                        </p:par>
+                      </p:childTnLst>
+                    </p:cTn>
+                  </p:par>
+                  <p:par>
+                    <p:cTn id="11" fill="hold">
+                      <p:stCondLst>
+                        <p:cond delay="indefinite"/>
+                      </p:stCondLst>
+                      <p:childTnLst>
+                        <p:par>
+                          <p:cTn id="12" fill="hold">
+                            <p:stCondLst>
+                              <p:cond delay="0"/>
+                            </p:stCondLst>
+                            <p:childTnLst>
+                              <p:par>
+                                <p:cTn id="13" presetID="1" presetClass="entr" presetSubtype="0" fill="hold" nodeType="clickEffect">
+                                  <p:stCondLst>
+                                    <p:cond delay="0"/>
+                                  </p:stCondLst>
+                                  <p:childTnLst>
+                                    <p:set>
+                                      <p:cBhvr>
+                                        <p:cTn id="14" dur="1" fill="hold">
+                                          <p:stCondLst>
+                                            <p:cond delay="0"/>
+                                          </p:stCondLst>
+                                        </p:cTn>
+                                        <p:tgtEl>
+                                          <p:spTgt spid="3">
+                                            <p:txEl>
+                                              <p:pRg st="2" end="2"/>
+                                            </p:txEl>
+                                          </p:spTgt>
+                                        </p:tgtEl>
+                                        <p:attrNameLst>
+                                          <p:attrName>style.visibility</p:attrName>
+                                        </p:attrNameLst>
+                                      </p:cBhvr>
+                                      <p:to>
+                                        <p:strVal val="visible"/>
+                                      </p:to>
+                                    </p:set>
+                                  </p:childTnLst>
+                                </p:cTn>
+                              </p:par>
+                            </p:childTnLst>
+                          </p:cTn>
+                        </p:par>
+                      </p:childTnLst>
+                    </p:cTn>
+                  </p:par>
+                </p:childTnLst>
+              </p:cTn>
+              <p:prevCondLst>
+                <p:cond evt="onPrev" delay="0">
+                  <p:tgtEl>
+                    <p:sldTgt/>
+                  </p:tgtEl>
+                </p:cond>
+              </p:prevCondLst>
+              <p:nextCondLst>
+                <p:cond evt="onNext" delay="0">
+                  <p:tgtEl>
+                    <p:sldTgt/>
+                  </p:tgtEl>
+                </p:cond>
+              </p:nextCondLst>
+            </p:seq>
+          </p:childTnLst>
+        </p:cTn>
+      </p:par>
+    </p:tnLst>
+  </p:timing>
 </p:sld>
 </file>
 
@@ -17599,34 +19481,34 @@
               <a:buAutoNum type="arabicPeriod"/>
             </a:pPr>
             <a:r>
-              <a:rPr lang="en-US" sz="2200">
+              <a:rPr lang="en-US" sz="2200" dirty="0">
                 <a:ea typeface="+mn-lt"/>
                 <a:cs typeface="+mn-lt"/>
               </a:rPr>
               <a:t>Consider possible approaches for your project and assess whether fine-tuning is [</a:t>
             </a:r>
             <a:r>
-              <a:rPr lang="en-US" sz="2200" i="1">
+              <a:rPr lang="en-US" sz="2200" i="1" dirty="0">
                 <a:ea typeface="+mn-lt"/>
                 <a:cs typeface="+mn-lt"/>
               </a:rPr>
               <a:t>appropriate</a:t>
             </a:r>
             <a:r>
-              <a:rPr lang="en-US" sz="2200">
+              <a:rPr lang="en-US" sz="2200" dirty="0">
                 <a:ea typeface="+mn-lt"/>
                 <a:cs typeface="+mn-lt"/>
               </a:rPr>
               <a:t>].</a:t>
             </a:r>
-            <a:endParaRPr lang="en-US"/>
+            <a:endParaRPr lang="en-US" dirty="0"/>
           </a:p>
           <a:p>
             <a:pPr marL="457200" indent="-457200">
               <a:buAutoNum type="arabicPeriod"/>
             </a:pPr>
             <a:r>
-              <a:rPr lang="en-US" sz="2200">
+              <a:rPr lang="en-US" sz="2200" dirty="0">
                 <a:ea typeface="+mn-lt"/>
                 <a:cs typeface="+mn-lt"/>
               </a:rPr>
@@ -17638,21 +19520,21 @@
               <a:buAutoNum type="arabicPeriod"/>
             </a:pPr>
             <a:r>
-              <a:rPr lang="en-US" sz="2200">
+              <a:rPr lang="en-US" sz="2200" dirty="0">
                 <a:ea typeface="+mn-lt"/>
                 <a:cs typeface="+mn-lt"/>
               </a:rPr>
               <a:t>Manually label an [</a:t>
             </a:r>
             <a:r>
-              <a:rPr lang="en-US" sz="2200" i="1">
+              <a:rPr lang="en-US" sz="2200" i="1" dirty="0">
                 <a:ea typeface="+mn-lt"/>
                 <a:cs typeface="+mn-lt"/>
               </a:rPr>
               <a:t>appropriate</a:t>
             </a:r>
             <a:r>
-              <a:rPr lang="en-US" sz="2200">
+              <a:rPr lang="en-US" sz="2200" dirty="0">
                 <a:ea typeface="+mn-lt"/>
                 <a:cs typeface="+mn-lt"/>
               </a:rPr>
@@ -17664,21 +19546,21 @@
               <a:buAutoNum type="arabicPeriod"/>
             </a:pPr>
             <a:r>
-              <a:rPr lang="en-US" sz="2200">
+              <a:rPr lang="en-US" sz="2200" dirty="0">
                 <a:ea typeface="+mn-lt"/>
                 <a:cs typeface="+mn-lt"/>
               </a:rPr>
               <a:t>Select [</a:t>
             </a:r>
             <a:r>
-              <a:rPr lang="en-US" sz="2200" i="1">
+              <a:rPr lang="en-US" sz="2200" i="1" dirty="0">
                 <a:ea typeface="+mn-lt"/>
                 <a:cs typeface="+mn-lt"/>
               </a:rPr>
               <a:t>appropriate</a:t>
             </a:r>
             <a:r>
-              <a:rPr lang="en-US" sz="2200">
+              <a:rPr lang="en-US" sz="2200" dirty="0">
                 <a:ea typeface="+mn-lt"/>
                 <a:cs typeface="+mn-lt"/>
               </a:rPr>
@@ -17690,21 +19572,21 @@
               <a:buAutoNum type="arabicPeriod"/>
             </a:pPr>
             <a:r>
-              <a:rPr lang="en-US" sz="2200">
+              <a:rPr lang="en-US" sz="2200" dirty="0">
                 <a:ea typeface="+mn-lt"/>
                 <a:cs typeface="+mn-lt"/>
               </a:rPr>
               <a:t>Consider the [</a:t>
             </a:r>
             <a:r>
-              <a:rPr lang="en-US" sz="2200" i="1">
+              <a:rPr lang="en-US" sz="2200" i="1" dirty="0">
                 <a:ea typeface="+mn-lt"/>
                 <a:cs typeface="+mn-lt"/>
               </a:rPr>
               <a:t>appropriate</a:t>
             </a:r>
             <a:r>
-              <a:rPr lang="en-US" sz="2200">
+              <a:rPr lang="en-US" sz="2200" dirty="0">
                 <a:ea typeface="+mn-lt"/>
                 <a:cs typeface="+mn-lt"/>
               </a:rPr>
@@ -17716,21 +19598,21 @@
               <a:buAutoNum type="arabicPeriod"/>
             </a:pPr>
             <a:r>
-              <a:rPr lang="en-US" sz="2200">
+              <a:rPr lang="en-US" sz="2200" dirty="0">
                 <a:ea typeface="+mn-lt"/>
                 <a:cs typeface="+mn-lt"/>
               </a:rPr>
               <a:t>Fine-tune the models, using a [</a:t>
             </a:r>
             <a:r>
-              <a:rPr lang="en-US" sz="2200" i="1">
+              <a:rPr lang="en-US" sz="2200" i="1" dirty="0">
                 <a:ea typeface="+mn-lt"/>
                 <a:cs typeface="+mn-lt"/>
               </a:rPr>
               <a:t>reasonable</a:t>
             </a:r>
             <a:r>
-              <a:rPr lang="en-US" sz="2200">
+              <a:rPr lang="en-US" sz="2200" dirty="0">
                 <a:ea typeface="+mn-lt"/>
                 <a:cs typeface="+mn-lt"/>
               </a:rPr>
@@ -17742,7 +19624,7 @@
               <a:buAutoNum type="arabicPeriod"/>
             </a:pPr>
             <a:r>
-              <a:rPr lang="en-US" sz="2200">
+              <a:rPr lang="en-US" sz="2200" dirty="0">
                 <a:ea typeface="+mn-lt"/>
                 <a:cs typeface="+mn-lt"/>
               </a:rPr>
@@ -17754,7 +19636,7 @@
               <a:buAutoNum type="arabicPeriod"/>
             </a:pPr>
             <a:r>
-              <a:rPr lang="en-US" sz="2200">
+              <a:rPr lang="en-US" sz="2200" dirty="0">
                 <a:ea typeface="+mn-lt"/>
                 <a:cs typeface="+mn-lt"/>
               </a:rPr>
@@ -17766,7 +19648,7 @@
               <a:buAutoNum type="arabicPeriod"/>
             </a:pPr>
             <a:r>
-              <a:rPr lang="en-US" sz="2200">
+              <a:rPr lang="en-US" sz="2200" dirty="0">
                 <a:ea typeface="+mn-lt"/>
                 <a:cs typeface="+mn-lt"/>
               </a:rPr>
@@ -17785,6 +19667,477 @@
   <p:clrMapOvr>
     <a:masterClrMapping/>
   </p:clrMapOvr>
+  <p:timing>
+    <p:tnLst>
+      <p:par>
+        <p:cTn id="1" dur="indefinite" restart="never" nodeType="tmRoot">
+          <p:childTnLst>
+            <p:seq concurrent="1" nextAc="seek">
+              <p:cTn id="2" dur="indefinite" nodeType="mainSeq">
+                <p:childTnLst>
+                  <p:par>
+                    <p:cTn id="3" fill="hold">
+                      <p:stCondLst>
+                        <p:cond delay="indefinite"/>
+                      </p:stCondLst>
+                      <p:childTnLst>
+                        <p:par>
+                          <p:cTn id="4" fill="hold">
+                            <p:stCondLst>
+                              <p:cond delay="0"/>
+                            </p:stCondLst>
+                            <p:childTnLst>
+                              <p:par>
+                                <p:cTn id="5" presetID="1" presetClass="entr" presetSubtype="0" fill="hold" nodeType="clickEffect">
+                                  <p:stCondLst>
+                                    <p:cond delay="0"/>
+                                  </p:stCondLst>
+                                  <p:childTnLst>
+                                    <p:set>
+                                      <p:cBhvr>
+                                        <p:cTn id="6" dur="1" fill="hold">
+                                          <p:stCondLst>
+                                            <p:cond delay="0"/>
+                                          </p:stCondLst>
+                                        </p:cTn>
+                                        <p:tgtEl>
+                                          <p:spTgt spid="3">
+                                            <p:txEl>
+                                              <p:pRg st="0" end="0"/>
+                                            </p:txEl>
+                                          </p:spTgt>
+                                        </p:tgtEl>
+                                        <p:attrNameLst>
+                                          <p:attrName>style.visibility</p:attrName>
+                                        </p:attrNameLst>
+                                      </p:cBhvr>
+                                      <p:to>
+                                        <p:strVal val="visible"/>
+                                      </p:to>
+                                    </p:set>
+                                  </p:childTnLst>
+                                </p:cTn>
+                              </p:par>
+                            </p:childTnLst>
+                          </p:cTn>
+                        </p:par>
+                      </p:childTnLst>
+                    </p:cTn>
+                  </p:par>
+                  <p:par>
+                    <p:cTn id="7" fill="hold">
+                      <p:stCondLst>
+                        <p:cond delay="indefinite"/>
+                      </p:stCondLst>
+                      <p:childTnLst>
+                        <p:par>
+                          <p:cTn id="8" fill="hold">
+                            <p:stCondLst>
+                              <p:cond delay="0"/>
+                            </p:stCondLst>
+                            <p:childTnLst>
+                              <p:par>
+                                <p:cTn id="9" presetID="1" presetClass="entr" presetSubtype="0" fill="hold" nodeType="clickEffect">
+                                  <p:stCondLst>
+                                    <p:cond delay="0"/>
+                                  </p:stCondLst>
+                                  <p:childTnLst>
+                                    <p:set>
+                                      <p:cBhvr>
+                                        <p:cTn id="10" dur="1" fill="hold">
+                                          <p:stCondLst>
+                                            <p:cond delay="0"/>
+                                          </p:stCondLst>
+                                        </p:cTn>
+                                        <p:tgtEl>
+                                          <p:spTgt spid="3">
+                                            <p:txEl>
+                                              <p:pRg st="1" end="1"/>
+                                            </p:txEl>
+                                          </p:spTgt>
+                                        </p:tgtEl>
+                                        <p:attrNameLst>
+                                          <p:attrName>style.visibility</p:attrName>
+                                        </p:attrNameLst>
+                                      </p:cBhvr>
+                                      <p:to>
+                                        <p:strVal val="visible"/>
+                                      </p:to>
+                                    </p:set>
+                                  </p:childTnLst>
+                                </p:cTn>
+                              </p:par>
+                            </p:childTnLst>
+                          </p:cTn>
+                        </p:par>
+                      </p:childTnLst>
+                    </p:cTn>
+                  </p:par>
+                  <p:par>
+                    <p:cTn id="11" fill="hold">
+                      <p:stCondLst>
+                        <p:cond delay="indefinite"/>
+                      </p:stCondLst>
+                      <p:childTnLst>
+                        <p:par>
+                          <p:cTn id="12" fill="hold">
+                            <p:stCondLst>
+                              <p:cond delay="0"/>
+                            </p:stCondLst>
+                            <p:childTnLst>
+                              <p:par>
+                                <p:cTn id="13" presetID="1" presetClass="entr" presetSubtype="0" fill="hold" nodeType="clickEffect">
+                                  <p:stCondLst>
+                                    <p:cond delay="0"/>
+                                  </p:stCondLst>
+                                  <p:childTnLst>
+                                    <p:set>
+                                      <p:cBhvr>
+                                        <p:cTn id="14" dur="1" fill="hold">
+                                          <p:stCondLst>
+                                            <p:cond delay="0"/>
+                                          </p:stCondLst>
+                                        </p:cTn>
+                                        <p:tgtEl>
+                                          <p:spTgt spid="3">
+                                            <p:txEl>
+                                              <p:pRg st="2" end="2"/>
+                                            </p:txEl>
+                                          </p:spTgt>
+                                        </p:tgtEl>
+                                        <p:attrNameLst>
+                                          <p:attrName>style.visibility</p:attrName>
+                                        </p:attrNameLst>
+                                      </p:cBhvr>
+                                      <p:to>
+                                        <p:strVal val="visible"/>
+                                      </p:to>
+                                    </p:set>
+                                  </p:childTnLst>
+                                </p:cTn>
+                              </p:par>
+                            </p:childTnLst>
+                          </p:cTn>
+                        </p:par>
+                      </p:childTnLst>
+                    </p:cTn>
+                  </p:par>
+                  <p:par>
+                    <p:cTn id="15" fill="hold">
+                      <p:stCondLst>
+                        <p:cond delay="indefinite"/>
+                      </p:stCondLst>
+                      <p:childTnLst>
+                        <p:par>
+                          <p:cTn id="16" fill="hold">
+                            <p:stCondLst>
+                              <p:cond delay="0"/>
+                            </p:stCondLst>
+                            <p:childTnLst>
+                              <p:par>
+                                <p:cTn id="17" presetID="1" presetClass="entr" presetSubtype="0" fill="hold" nodeType="clickEffect">
+                                  <p:stCondLst>
+                                    <p:cond delay="0"/>
+                                  </p:stCondLst>
+                                  <p:childTnLst>
+                                    <p:set>
+                                      <p:cBhvr>
+                                        <p:cTn id="18" dur="1" fill="hold">
+                                          <p:stCondLst>
+                                            <p:cond delay="0"/>
+                                          </p:stCondLst>
+                                        </p:cTn>
+                                        <p:tgtEl>
+                                          <p:spTgt spid="3">
+                                            <p:txEl>
+                                              <p:pRg st="3" end="3"/>
+                                            </p:txEl>
+                                          </p:spTgt>
+                                        </p:tgtEl>
+                                        <p:attrNameLst>
+                                          <p:attrName>style.visibility</p:attrName>
+                                        </p:attrNameLst>
+                                      </p:cBhvr>
+                                      <p:to>
+                                        <p:strVal val="visible"/>
+                                      </p:to>
+                                    </p:set>
+                                  </p:childTnLst>
+                                </p:cTn>
+                              </p:par>
+                            </p:childTnLst>
+                          </p:cTn>
+                        </p:par>
+                      </p:childTnLst>
+                    </p:cTn>
+                  </p:par>
+                  <p:par>
+                    <p:cTn id="19" fill="hold">
+                      <p:stCondLst>
+                        <p:cond delay="indefinite"/>
+                      </p:stCondLst>
+                      <p:childTnLst>
+                        <p:par>
+                          <p:cTn id="20" fill="hold">
+                            <p:stCondLst>
+                              <p:cond delay="0"/>
+                            </p:stCondLst>
+                            <p:childTnLst>
+                              <p:par>
+                                <p:cTn id="21" presetID="1" presetClass="entr" presetSubtype="0" fill="hold" nodeType="clickEffect">
+                                  <p:stCondLst>
+                                    <p:cond delay="0"/>
+                                  </p:stCondLst>
+                                  <p:childTnLst>
+                                    <p:set>
+                                      <p:cBhvr>
+                                        <p:cTn id="22" dur="1" fill="hold">
+                                          <p:stCondLst>
+                                            <p:cond delay="0"/>
+                                          </p:stCondLst>
+                                        </p:cTn>
+                                        <p:tgtEl>
+                                          <p:spTgt spid="3">
+                                            <p:txEl>
+                                              <p:pRg st="4" end="4"/>
+                                            </p:txEl>
+                                          </p:spTgt>
+                                        </p:tgtEl>
+                                        <p:attrNameLst>
+                                          <p:attrName>style.visibility</p:attrName>
+                                        </p:attrNameLst>
+                                      </p:cBhvr>
+                                      <p:to>
+                                        <p:strVal val="visible"/>
+                                      </p:to>
+                                    </p:set>
+                                  </p:childTnLst>
+                                </p:cTn>
+                              </p:par>
+                            </p:childTnLst>
+                          </p:cTn>
+                        </p:par>
+                      </p:childTnLst>
+                    </p:cTn>
+                  </p:par>
+                  <p:par>
+                    <p:cTn id="23" fill="hold">
+                      <p:stCondLst>
+                        <p:cond delay="indefinite"/>
+                      </p:stCondLst>
+                      <p:childTnLst>
+                        <p:par>
+                          <p:cTn id="24" fill="hold">
+                            <p:stCondLst>
+                              <p:cond delay="0"/>
+                            </p:stCondLst>
+                            <p:childTnLst>
+                              <p:par>
+                                <p:cTn id="25" presetID="1" presetClass="entr" presetSubtype="0" fill="hold" nodeType="clickEffect">
+                                  <p:stCondLst>
+                                    <p:cond delay="0"/>
+                                  </p:stCondLst>
+                                  <p:childTnLst>
+                                    <p:set>
+                                      <p:cBhvr>
+                                        <p:cTn id="26" dur="1" fill="hold">
+                                          <p:stCondLst>
+                                            <p:cond delay="0"/>
+                                          </p:stCondLst>
+                                        </p:cTn>
+                                        <p:tgtEl>
+                                          <p:spTgt spid="3">
+                                            <p:txEl>
+                                              <p:pRg st="5" end="5"/>
+                                            </p:txEl>
+                                          </p:spTgt>
+                                        </p:tgtEl>
+                                        <p:attrNameLst>
+                                          <p:attrName>style.visibility</p:attrName>
+                                        </p:attrNameLst>
+                                      </p:cBhvr>
+                                      <p:to>
+                                        <p:strVal val="visible"/>
+                                      </p:to>
+                                    </p:set>
+                                  </p:childTnLst>
+                                </p:cTn>
+                              </p:par>
+                            </p:childTnLst>
+                          </p:cTn>
+                        </p:par>
+                      </p:childTnLst>
+                    </p:cTn>
+                  </p:par>
+                  <p:par>
+                    <p:cTn id="27" fill="hold">
+                      <p:stCondLst>
+                        <p:cond delay="indefinite"/>
+                      </p:stCondLst>
+                      <p:childTnLst>
+                        <p:par>
+                          <p:cTn id="28" fill="hold">
+                            <p:stCondLst>
+                              <p:cond delay="0"/>
+                            </p:stCondLst>
+                            <p:childTnLst>
+                              <p:par>
+                                <p:cTn id="29" presetID="1" presetClass="entr" presetSubtype="0" fill="hold" nodeType="clickEffect">
+                                  <p:stCondLst>
+                                    <p:cond delay="0"/>
+                                  </p:stCondLst>
+                                  <p:childTnLst>
+                                    <p:set>
+                                      <p:cBhvr>
+                                        <p:cTn id="30" dur="1" fill="hold">
+                                          <p:stCondLst>
+                                            <p:cond delay="0"/>
+                                          </p:stCondLst>
+                                        </p:cTn>
+                                        <p:tgtEl>
+                                          <p:spTgt spid="3">
+                                            <p:txEl>
+                                              <p:pRg st="6" end="6"/>
+                                            </p:txEl>
+                                          </p:spTgt>
+                                        </p:tgtEl>
+                                        <p:attrNameLst>
+                                          <p:attrName>style.visibility</p:attrName>
+                                        </p:attrNameLst>
+                                      </p:cBhvr>
+                                      <p:to>
+                                        <p:strVal val="visible"/>
+                                      </p:to>
+                                    </p:set>
+                                  </p:childTnLst>
+                                </p:cTn>
+                              </p:par>
+                            </p:childTnLst>
+                          </p:cTn>
+                        </p:par>
+                      </p:childTnLst>
+                    </p:cTn>
+                  </p:par>
+                  <p:par>
+                    <p:cTn id="31" fill="hold">
+                      <p:stCondLst>
+                        <p:cond delay="indefinite"/>
+                      </p:stCondLst>
+                      <p:childTnLst>
+                        <p:par>
+                          <p:cTn id="32" fill="hold">
+                            <p:stCondLst>
+                              <p:cond delay="0"/>
+                            </p:stCondLst>
+                            <p:childTnLst>
+                              <p:par>
+                                <p:cTn id="33" presetID="1" presetClass="entr" presetSubtype="0" fill="hold" nodeType="clickEffect">
+                                  <p:stCondLst>
+                                    <p:cond delay="0"/>
+                                  </p:stCondLst>
+                                  <p:childTnLst>
+                                    <p:set>
+                                      <p:cBhvr>
+                                        <p:cTn id="34" dur="1" fill="hold">
+                                          <p:stCondLst>
+                                            <p:cond delay="0"/>
+                                          </p:stCondLst>
+                                        </p:cTn>
+                                        <p:tgtEl>
+                                          <p:spTgt spid="3">
+                                            <p:txEl>
+                                              <p:pRg st="7" end="7"/>
+                                            </p:txEl>
+                                          </p:spTgt>
+                                        </p:tgtEl>
+                                        <p:attrNameLst>
+                                          <p:attrName>style.visibility</p:attrName>
+                                        </p:attrNameLst>
+                                      </p:cBhvr>
+                                      <p:to>
+                                        <p:strVal val="visible"/>
+                                      </p:to>
+                                    </p:set>
+                                  </p:childTnLst>
+                                </p:cTn>
+                              </p:par>
+                            </p:childTnLst>
+                          </p:cTn>
+                        </p:par>
+                      </p:childTnLst>
+                    </p:cTn>
+                  </p:par>
+                  <p:par>
+                    <p:cTn id="35" fill="hold">
+                      <p:stCondLst>
+                        <p:cond delay="indefinite"/>
+                      </p:stCondLst>
+                      <p:childTnLst>
+                        <p:par>
+                          <p:cTn id="36" fill="hold">
+                            <p:stCondLst>
+                              <p:cond delay="0"/>
+                            </p:stCondLst>
+                            <p:childTnLst>
+                              <p:par>
+                                <p:cTn id="37" presetID="1" presetClass="entr" presetSubtype="0" fill="hold" nodeType="clickEffect">
+                                  <p:stCondLst>
+                                    <p:cond delay="0"/>
+                                  </p:stCondLst>
+                                  <p:childTnLst>
+                                    <p:set>
+                                      <p:cBhvr>
+                                        <p:cTn id="38" dur="1" fill="hold">
+                                          <p:stCondLst>
+                                            <p:cond delay="0"/>
+                                          </p:stCondLst>
+                                        </p:cTn>
+                                        <p:tgtEl>
+                                          <p:spTgt spid="3">
+                                            <p:txEl>
+                                              <p:pRg st="8" end="8"/>
+                                            </p:txEl>
+                                          </p:spTgt>
+                                        </p:tgtEl>
+                                        <p:attrNameLst>
+                                          <p:attrName>style.visibility</p:attrName>
+                                        </p:attrNameLst>
+                                      </p:cBhvr>
+                                      <p:to>
+                                        <p:strVal val="visible"/>
+                                      </p:to>
+                                    </p:set>
+                                  </p:childTnLst>
+                                </p:cTn>
+                              </p:par>
+                            </p:childTnLst>
+                          </p:cTn>
+                        </p:par>
+                      </p:childTnLst>
+                    </p:cTn>
+                  </p:par>
+                </p:childTnLst>
+              </p:cTn>
+              <p:prevCondLst>
+                <p:cond evt="onPrev" delay="0">
+                  <p:tgtEl>
+                    <p:sldTgt/>
+                  </p:tgtEl>
+                </p:cond>
+              </p:prevCondLst>
+              <p:nextCondLst>
+                <p:cond evt="onNext" delay="0">
+                  <p:tgtEl>
+                    <p:sldTgt/>
+                  </p:tgtEl>
+                </p:cond>
+              </p:nextCondLst>
+            </p:seq>
+          </p:childTnLst>
+        </p:cTn>
+      </p:par>
+    </p:tnLst>
+  </p:timing>
 </p:sld>
 </file>
 
@@ -18438,61 +20791,61 @@
           </a:bodyPr>
           <a:lstStyle/>
           <a:p>
-            <a:endParaRPr lang="en-US"/>
-          </a:p>
-          <a:p>
-            <a:endParaRPr lang="en-US"/>
-          </a:p>
-          <a:p>
-            <a:endParaRPr lang="en-US"/>
-          </a:p>
-          <a:p>
-            <a:r>
-              <a:rPr lang="en-US"/>
+            <a:endParaRPr lang="en-US" dirty="0"/>
+          </a:p>
+          <a:p>
+            <a:endParaRPr lang="en-US" dirty="0"/>
+          </a:p>
+          <a:p>
+            <a:endParaRPr lang="en-US" dirty="0"/>
+          </a:p>
+          <a:p>
+            <a:r>
+              <a:rPr lang="en-US" dirty="0"/>
               <a:t>Dataset from Laurer, M., van </a:t>
             </a:r>
             <a:r>
-              <a:rPr lang="en-US" err="1"/>
+              <a:rPr lang="en-US" dirty="0" err="1"/>
               <a:t>Atteveldt</a:t>
             </a:r>
             <a:r>
-              <a:rPr lang="en-US"/>
+              <a:rPr lang="en-US" dirty="0"/>
               <a:t>, W., Casas, A. &amp; </a:t>
             </a:r>
             <a:r>
-              <a:rPr lang="en-US" err="1"/>
+              <a:rPr lang="en-US" dirty="0" err="1"/>
               <a:t>Welbers,K</a:t>
             </a:r>
             <a:r>
-              <a:rPr lang="en-US"/>
+              <a:rPr lang="en-US" dirty="0"/>
               <a:t>. (2024). Less Annotating, More Classifying: Addressing the </a:t>
             </a:r>
             <a:r>
-              <a:rPr lang="en-US" err="1"/>
+              <a:rPr lang="en-US" dirty="0" err="1"/>
               <a:t>DataScarcity</a:t>
             </a:r>
             <a:r>
-              <a:rPr lang="en-US"/>
+              <a:rPr lang="en-US" dirty="0"/>
               <a:t> Issue of Supervised Machine Learning with Deep Transfer Learning and BERT-NLI. </a:t>
             </a:r>
             <a:r>
-              <a:rPr lang="en-US" i="1"/>
+              <a:rPr lang="en-US" i="1" dirty="0"/>
               <a:t>Political Analysis</a:t>
             </a:r>
             <a:r>
-              <a:rPr lang="en-US"/>
+              <a:rPr lang="en-US" dirty="0"/>
               <a:t>, 32, 84 – 100.</a:t>
             </a:r>
           </a:p>
           <a:p>
             <a:r>
-              <a:rPr lang="en-US">
+              <a:rPr lang="en-US" dirty="0">
                 <a:hlinkClick r:id="rId2"/>
               </a:rPr>
               <a:t>https://github.com/MoritzLaurer/less-annotating-with-bert-nli</a:t>
             </a:r>
             <a:r>
-              <a:rPr lang="en-US"/>
+              <a:rPr lang="en-US" dirty="0"/>
               <a:t> </a:t>
             </a:r>
           </a:p>
@@ -18501,13 +20854,13 @@
               <a:buFont typeface="Arial,Sans-Serif" panose="020B0604020202020204" pitchFamily="34" charset="0"/>
             </a:pPr>
             <a:r>
-              <a:rPr lang="en-US" sz="2600"/>
+              <a:rPr lang="en-US" sz="2600" dirty="0"/>
               <a:t>Research question: in which country is protectionist political speech more prevalent?</a:t>
             </a:r>
           </a:p>
           <a:p>
             <a:r>
-              <a:rPr lang="en-US"/>
+              <a:rPr lang="en-US" dirty="0"/>
               <a:t>Machine learning task: classify documents into protectionist or not.</a:t>
             </a:r>
           </a:p>
@@ -18655,6 +21008,134 @@
   <p:clrMapOvr>
     <a:masterClrMapping/>
   </p:clrMapOvr>
+  <p:timing>
+    <p:tnLst>
+      <p:par>
+        <p:cTn id="1" dur="indefinite" restart="never" nodeType="tmRoot">
+          <p:childTnLst>
+            <p:seq concurrent="1" nextAc="seek">
+              <p:cTn id="2" dur="indefinite" nodeType="mainSeq">
+                <p:childTnLst>
+                  <p:par>
+                    <p:cTn id="3" fill="hold">
+                      <p:stCondLst>
+                        <p:cond delay="indefinite"/>
+                      </p:stCondLst>
+                      <p:childTnLst>
+                        <p:par>
+                          <p:cTn id="4" fill="hold">
+                            <p:stCondLst>
+                              <p:cond delay="0"/>
+                            </p:stCondLst>
+                            <p:childTnLst>
+                              <p:par>
+                                <p:cTn id="5" presetID="1" presetClass="entr" presetSubtype="0" fill="hold" nodeType="clickEffect">
+                                  <p:stCondLst>
+                                    <p:cond delay="0"/>
+                                  </p:stCondLst>
+                                  <p:childTnLst>
+                                    <p:set>
+                                      <p:cBhvr>
+                                        <p:cTn id="6" dur="1" fill="hold">
+                                          <p:stCondLst>
+                                            <p:cond delay="0"/>
+                                          </p:stCondLst>
+                                        </p:cTn>
+                                        <p:tgtEl>
+                                          <p:spTgt spid="3">
+                                            <p:txEl>
+                                              <p:pRg st="5" end="5"/>
+                                            </p:txEl>
+                                          </p:spTgt>
+                                        </p:tgtEl>
+                                        <p:attrNameLst>
+                                          <p:attrName>style.visibility</p:attrName>
+                                        </p:attrNameLst>
+                                      </p:cBhvr>
+                                      <p:to>
+                                        <p:strVal val="visible"/>
+                                      </p:to>
+                                    </p:set>
+                                  </p:childTnLst>
+                                </p:cTn>
+                              </p:par>
+                            </p:childTnLst>
+                          </p:cTn>
+                        </p:par>
+                      </p:childTnLst>
+                    </p:cTn>
+                  </p:par>
+                  <p:par>
+                    <p:cTn id="7" fill="hold">
+                      <p:stCondLst>
+                        <p:cond delay="indefinite"/>
+                      </p:stCondLst>
+                      <p:childTnLst>
+                        <p:par>
+                          <p:cTn id="8" fill="hold">
+                            <p:stCondLst>
+                              <p:cond delay="0"/>
+                            </p:stCondLst>
+                            <p:childTnLst>
+                              <p:par>
+                                <p:cTn id="9" presetID="1" presetClass="entr" presetSubtype="0" fill="hold" nodeType="clickEffect">
+                                  <p:stCondLst>
+                                    <p:cond delay="0"/>
+                                  </p:stCondLst>
+                                  <p:childTnLst>
+                                    <p:set>
+                                      <p:cBhvr>
+                                        <p:cTn id="10" dur="1" fill="hold">
+                                          <p:stCondLst>
+                                            <p:cond delay="0"/>
+                                          </p:stCondLst>
+                                        </p:cTn>
+                                        <p:tgtEl>
+                                          <p:spTgt spid="3">
+                                            <p:txEl>
+                                              <p:pRg st="6" end="6"/>
+                                            </p:txEl>
+                                          </p:spTgt>
+                                        </p:tgtEl>
+                                        <p:attrNameLst>
+                                          <p:attrName>style.visibility</p:attrName>
+                                        </p:attrNameLst>
+                                      </p:cBhvr>
+                                      <p:to>
+                                        <p:strVal val="visible"/>
+                                      </p:to>
+                                    </p:set>
+                                  </p:childTnLst>
+                                </p:cTn>
+                              </p:par>
+                            </p:childTnLst>
+                          </p:cTn>
+                        </p:par>
+                      </p:childTnLst>
+                    </p:cTn>
+                  </p:par>
+                </p:childTnLst>
+              </p:cTn>
+              <p:prevCondLst>
+                <p:cond evt="onPrev" delay="0">
+                  <p:tgtEl>
+                    <p:sldTgt/>
+                  </p:tgtEl>
+                </p:cond>
+              </p:prevCondLst>
+              <p:nextCondLst>
+                <p:cond evt="onNext" delay="0">
+                  <p:tgtEl>
+                    <p:sldTgt/>
+                  </p:tgtEl>
+                </p:cond>
+              </p:nextCondLst>
+            </p:seq>
+          </p:childTnLst>
+        </p:cTn>
+      </p:par>
+    </p:tnLst>
+  </p:timing>
 </p:sld>
 </file>
 
@@ -18733,7 +21214,7 @@
           <a:lstStyle/>
           <a:p>
             <a:r>
-              <a:rPr lang="en-US"/>
+              <a:rPr lang="en-US" dirty="0"/>
               <a:t>For fine-tuning, it is useful to have access to GPUs, which can more efficiently handle complex mathematical operations in parallel.</a:t>
             </a:r>
           </a:p>
@@ -18743,11 +21224,11 @@
               <a:buChar char="•"/>
             </a:pPr>
             <a:r>
-              <a:rPr lang="en-US"/>
+              <a:rPr lang="en-US" dirty="0"/>
               <a:t>For your research, you can use GPUs on Quest: </a:t>
             </a:r>
             <a:r>
-              <a:rPr lang="en-US">
+              <a:rPr lang="en-US" dirty="0">
                 <a:ea typeface="+mn-lt"/>
                 <a:cs typeface="+mn-lt"/>
                 <a:hlinkClick r:id="rId3"/>
@@ -18755,7 +21236,7 @@
               <a:t>https://services.northwestern.edu/TDClient/30/Portal/KB/ArticleDet?ID=1112</a:t>
             </a:r>
             <a:r>
-              <a:rPr lang="en-US">
+              <a:rPr lang="en-US" dirty="0">
                 <a:ea typeface="+mn-lt"/>
                 <a:cs typeface="+mn-lt"/>
               </a:rPr>
@@ -18764,19 +21245,19 @@
           </a:p>
           <a:p>
             <a:r>
-              <a:rPr lang="en-US"/>
+              <a:rPr lang="en-US" dirty="0"/>
               <a:t>Today we're using Google </a:t>
             </a:r>
             <a:r>
-              <a:rPr lang="en-US" err="1"/>
+              <a:rPr lang="en-US" dirty="0" err="1"/>
               <a:t>Colab</a:t>
             </a:r>
             <a:r>
-              <a:rPr lang="en-US"/>
+              <a:rPr lang="en-US" dirty="0"/>
               <a:t>: </a:t>
             </a:r>
             <a:r>
-              <a:rPr lang="en-US">
+              <a:rPr lang="en-US" dirty="0">
                 <a:ea typeface="+mn-lt"/>
                 <a:cs typeface="+mn-lt"/>
                 <a:hlinkClick r:id="rId4"/>
@@ -18784,13 +21265,13 @@
               <a:t>https://colab.research.google.com/</a:t>
             </a:r>
             <a:r>
-              <a:rPr lang="en-US">
+              <a:rPr lang="en-US" dirty="0">
                 <a:ea typeface="+mn-lt"/>
                 <a:cs typeface="+mn-lt"/>
               </a:rPr>
               <a:t> </a:t>
             </a:r>
-            <a:endParaRPr lang="en-US"/>
+            <a:endParaRPr lang="en-US" dirty="0"/>
           </a:p>
           <a:p>
             <a:pPr lvl="1">
@@ -18798,29 +21279,29 @@
               <a:buChar char="o"/>
             </a:pPr>
             <a:r>
-              <a:rPr lang="en-US"/>
+              <a:rPr lang="en-US" dirty="0"/>
               <a:t>In the top bar, click on "Runtime" &gt; click on "Change runtime type" &gt; select "CPU" or "T4 GPU".</a:t>
             </a:r>
           </a:p>
           <a:p>
             <a:r>
-              <a:rPr lang="en-US"/>
+              <a:rPr lang="en-US" dirty="0"/>
               <a:t>It's unclear how much GPU access Google </a:t>
             </a:r>
             <a:r>
-              <a:rPr lang="en-US" err="1"/>
+              <a:rPr lang="en-US" dirty="0" err="1"/>
               <a:t>Colab</a:t>
             </a:r>
             <a:r>
-              <a:rPr lang="en-US"/>
+              <a:rPr lang="en-US" dirty="0"/>
               <a:t> provides. Close your Google </a:t>
             </a:r>
             <a:r>
-              <a:rPr lang="en-US" err="1"/>
+              <a:rPr lang="en-US" dirty="0" err="1"/>
               <a:t>Colab</a:t>
             </a:r>
             <a:r>
-              <a:rPr lang="en-US"/>
+              <a:rPr lang="en-US" dirty="0"/>
               <a:t> tabs when you're done with your work and avoid opting for GPUs when you don't need it.</a:t>
             </a:r>
           </a:p>
@@ -18908,23 +21389,23 @@
           <a:lstStyle/>
           <a:p>
             <a:r>
-              <a:rPr lang="en-US"/>
+              <a:rPr lang="en-US" dirty="0"/>
               <a:t>Transformers library: </a:t>
             </a:r>
             <a:r>
-              <a:rPr lang="en-US">
+              <a:rPr lang="en-US" dirty="0">
                 <a:hlinkClick r:id="rId2"/>
               </a:rPr>
               <a:t>https://huggingface.co/docs/transformers/en/index</a:t>
             </a:r>
             <a:r>
-              <a:rPr lang="en-US"/>
+              <a:rPr lang="en-US" dirty="0"/>
               <a:t> </a:t>
             </a:r>
           </a:p>
           <a:p>
             <a:r>
-              <a:rPr lang="en-US"/>
+              <a:rPr lang="en-US" dirty="0"/>
               <a:t>Models for today:</a:t>
             </a:r>
           </a:p>
@@ -18934,14 +21415,14 @@
               <a:buChar char="o"/>
             </a:pPr>
             <a:r>
-              <a:rPr lang="en-US">
+              <a:rPr lang="en-US" dirty="0">
                 <a:ea typeface="+mn-lt"/>
                 <a:cs typeface="+mn-lt"/>
                 <a:hlinkClick r:id="rId3"/>
               </a:rPr>
               <a:t>https://huggingface.co/google-bert/bert-base-uncased</a:t>
             </a:r>
-            <a:endParaRPr lang="en-US">
+            <a:endParaRPr lang="en-US" dirty="0">
               <a:ea typeface="+mn-lt"/>
               <a:cs typeface="+mn-lt"/>
             </a:endParaRPr>
@@ -18952,14 +21433,14 @@
               <a:buChar char="o"/>
             </a:pPr>
             <a:r>
-              <a:rPr lang="en-US">
+              <a:rPr lang="en-US" dirty="0">
                 <a:ea typeface="+mn-lt"/>
                 <a:cs typeface="+mn-lt"/>
                 <a:hlinkClick r:id="rId4"/>
               </a:rPr>
               <a:t>https://huggingface.co/distilbert/distilbert-base-uncased</a:t>
             </a:r>
-            <a:endParaRPr lang="en-US"/>
+            <a:endParaRPr lang="en-US" dirty="0"/>
           </a:p>
           <a:p>
             <a:pPr lvl="1">
@@ -18967,7 +21448,7 @@
               <a:buChar char="o"/>
             </a:pPr>
             <a:r>
-              <a:rPr lang="en-US">
+              <a:rPr lang="en-US" dirty="0">
                 <a:ea typeface="+mn-lt"/>
                 <a:cs typeface="+mn-lt"/>
                 <a:hlinkClick r:id="rId5"/>
@@ -18975,7 +21456,7 @@
               <a:t>https://huggingface.co/FacebookAI/roberta-base</a:t>
             </a:r>
             <a:r>
-              <a:rPr lang="en-US">
+              <a:rPr lang="en-US" dirty="0">
                 <a:ea typeface="+mn-lt"/>
                 <a:cs typeface="+mn-lt"/>
               </a:rPr>
@@ -18988,14 +21469,14 @@
               <a:buChar char="o"/>
             </a:pPr>
             <a:r>
-              <a:rPr lang="en-US">
+              <a:rPr lang="en-US" dirty="0">
                 <a:ea typeface="+mn-lt"/>
                 <a:cs typeface="+mn-lt"/>
                 <a:hlinkClick r:id="rId6"/>
               </a:rPr>
               <a:t>https://huggingface.co/distilbert/distilroberta-base</a:t>
             </a:r>
-            <a:endParaRPr lang="en-US">
+            <a:endParaRPr lang="en-US" dirty="0">
               <a:ea typeface="+mn-lt"/>
               <a:cs typeface="+mn-lt"/>
             </a:endParaRPr>
@@ -19950,63 +22431,57 @@
         <p:spPr/>
         <p:txBody>
           <a:bodyPr vert="horz" lIns="91440" tIns="45720" rIns="91440" bIns="45720" rtlCol="0" anchor="t">
-            <a:normAutofit fontScale="92500" lnSpcReduction="10000"/>
+            <a:normAutofit fontScale="92500"/>
           </a:bodyPr>
           <a:lstStyle/>
           <a:p>
             <a:r>
-              <a:rPr lang="en-US"/>
-              <a:t>~11:30 (10 mins): Form groups of 3-4 people.</a:t>
-            </a:r>
-          </a:p>
-          <a:p>
-            <a:r>
-              <a:rPr lang="en-US"/>
-              <a:t>~11:40 (20 mins): Decide on a dataset and a question.</a:t>
-            </a:r>
-          </a:p>
-          <a:p>
-            <a:r>
-              <a:rPr lang="en-US"/>
-              <a:t>~12:00 (15 mins): Test that you can use the tools for today.</a:t>
-            </a:r>
-          </a:p>
-          <a:p>
-            <a:r>
-              <a:rPr lang="en-US"/>
-              <a:t>~12:15 (60 mins): Lunch break</a:t>
-            </a:r>
-          </a:p>
-          <a:p>
-            <a:r>
-              <a:rPr lang="en-US"/>
-              <a:t>~1:15 (60 mins): Fine-tune and answer your question.</a:t>
-            </a:r>
-          </a:p>
-          <a:p>
-            <a:r>
-              <a:rPr lang="en-US"/>
-              <a:t>~2:15 (60 mins): Present your dataset, question, fine-tuning strategy, results, and any challenges/lessons.</a:t>
-            </a:r>
-          </a:p>
-          <a:p>
-            <a:r>
-              <a:rPr lang="en-US"/>
-              <a:t>~3:15 (15 mins): Questions, recap, and next steps to continue learning.</a:t>
+              <a:rPr lang="en-US" dirty="0"/>
+              <a:t>~1:10 (5 mins): Form groups of 3-4 people.</a:t>
+            </a:r>
+          </a:p>
+          <a:p>
+            <a:r>
+              <a:rPr lang="en-US" dirty="0"/>
+              <a:t>~1:15 (15 mins): Decide on a dataset and a question.</a:t>
+            </a:r>
+          </a:p>
+          <a:p>
+            <a:r>
+              <a:rPr lang="en-US" dirty="0"/>
+              <a:t>~1:30 (15 mins): Test that you can use the tools for today.</a:t>
+            </a:r>
+          </a:p>
+          <a:p>
+            <a:r>
+              <a:rPr lang="en-US" dirty="0"/>
+              <a:t>~1:45 (60 mins): Fine-tune and answer your question.</a:t>
+            </a:r>
+          </a:p>
+          <a:p>
+            <a:r>
+              <a:rPr lang="en-US" dirty="0"/>
+              <a:t>~2:45 (50 mins = 10 mins per group): Present your dataset, question, fine-tuning strategy, results, and any challenges/lessons.</a:t>
+            </a:r>
+          </a:p>
+          <a:p>
+            <a:r>
+              <a:rPr lang="en-US" dirty="0"/>
+              <a:t>~3:35 (15 mins): Questions, recap, and next steps to continue learning.</a:t>
             </a:r>
           </a:p>
           <a:p>
             <a:pPr marL="0" indent="0">
               <a:buNone/>
             </a:pPr>
-            <a:endParaRPr lang="en-US"/>
+            <a:endParaRPr lang="en-US" dirty="0"/>
           </a:p>
           <a:p>
             <a:pPr marL="0" indent="0" algn="ctr">
               <a:buNone/>
             </a:pPr>
             <a:r>
-              <a:rPr lang="en-US"/>
+              <a:rPr lang="en-US" dirty="0"/>
               <a:t>We may finish early, but I'll be here until 4pm for questions. We can also go through some of the appendix slides if time permits.</a:t>
             </a:r>
           </a:p>
@@ -27953,6 +30428,15 @@
 </file>
 
 <file path=customXml/item1.xml><?xml version="1.0" encoding="utf-8"?>
+<?mso-contentType ?>
+<FormTemplates xmlns="http://schemas.microsoft.com/sharepoint/v3/contenttype/forms">
+  <Display>DocumentLibraryForm</Display>
+  <Edit>DocumentLibraryForm</Edit>
+  <New>DocumentLibraryForm</New>
+</FormTemplates>
+</file>
+
+<file path=customXml/item2.xml><?xml version="1.0" encoding="utf-8"?>
 <p:properties xmlns:p="http://schemas.microsoft.com/office/2006/metadata/properties" xmlns:xsi="http://www.w3.org/2001/XMLSchema-instance" xmlns:pc="http://schemas.microsoft.com/office/infopath/2007/PartnerControls">
   <documentManagement>
     <Notes xmlns="2abaa01e-9938-407e-aa0b-10580c653abd" xsi:nil="true"/>
@@ -27964,7 +30448,7 @@
 </p:properties>
 </file>
 
-<file path=customXml/item2.xml><?xml version="1.0" encoding="utf-8"?>
+<file path=customXml/item3.xml><?xml version="1.0" encoding="utf-8"?>
 <ct:contentTypeSchema xmlns:ct="http://schemas.microsoft.com/office/2006/metadata/contentType" xmlns:ma="http://schemas.microsoft.com/office/2006/metadata/properties/metaAttributes" ct:_="" ma:_="" ma:contentTypeName="Document" ma:contentTypeID="0x010100A0BC9924B2BE754D9B1ADDA1D4CEDCCC" ma:contentTypeVersion="20" ma:contentTypeDescription="Create a new document." ma:contentTypeScope="" ma:versionID="4338fadee27a2b349d14c729eca432ee">
   <xsd:schema xmlns:xsd="http://www.w3.org/2001/XMLSchema" xmlns:xs="http://www.w3.org/2001/XMLSchema" xmlns:p="http://schemas.microsoft.com/office/2006/metadata/properties" xmlns:ns2="2abaa01e-9938-407e-aa0b-10580c653abd" xmlns:ns3="7be34c64-93b8-4842-bfae-c3106b8c53c2" xmlns:ns4="efce84db-8738-4c7b-9bdc-65b9500871f6" targetNamespace="http://schemas.microsoft.com/office/2006/metadata/properties" ma:root="true" ma:fieldsID="edf0bcebcd0cdd63ab6270adfc88f193" ns2:_="" ns3:_="" ns4:_="">
     <xsd:import namespace="2abaa01e-9938-407e-aa0b-10580c653abd"/>
@@ -28232,16 +30716,15 @@
 </ct:contentTypeSchema>
 </file>
 
-<file path=customXml/item3.xml><?xml version="1.0" encoding="utf-8"?>
-<?mso-contentType ?>
-<FormTemplates xmlns="http://schemas.microsoft.com/sharepoint/v3/contenttype/forms">
-  <Display>DocumentLibraryForm</Display>
-  <Edit>DocumentLibraryForm</Edit>
-  <New>DocumentLibraryForm</New>
-</FormTemplates>
+<file path=customXml/itemProps1.xml><?xml version="1.0" encoding="utf-8"?>
+<ds:datastoreItem xmlns:ds="http://schemas.openxmlformats.org/officeDocument/2006/customXml" ds:itemID="{D2D699D9-1B31-4616-8FB0-B4CEE1C49142}">
+  <ds:schemaRefs>
+    <ds:schemaRef ds:uri="http://schemas.microsoft.com/sharepoint/v3/contenttype/forms"/>
+  </ds:schemaRefs>
+</ds:datastoreItem>
 </file>
 
-<file path=customXml/itemProps1.xml><?xml version="1.0" encoding="utf-8"?>
+<file path=customXml/itemProps2.xml><?xml version="1.0" encoding="utf-8"?>
 <ds:datastoreItem xmlns:ds="http://schemas.openxmlformats.org/officeDocument/2006/customXml" ds:itemID="{3BE9614C-AFF3-4042-B96A-BCA0CA447D5C}">
   <ds:schemaRefs>
     <ds:schemaRef ds:uri="2abaa01e-9938-407e-aa0b-10580c653abd"/>
@@ -28252,7 +30735,7 @@
 </ds:datastoreItem>
 </file>
 
-<file path=customXml/itemProps2.xml><?xml version="1.0" encoding="utf-8"?>
+<file path=customXml/itemProps3.xml><?xml version="1.0" encoding="utf-8"?>
 <ds:datastoreItem xmlns:ds="http://schemas.openxmlformats.org/officeDocument/2006/customXml" ds:itemID="{899289E1-66BA-46F4-B9DB-AE3B040C479C}">
   <ds:schemaRefs>
     <ds:schemaRef ds:uri="2abaa01e-9938-407e-aa0b-10580c653abd"/>
@@ -28270,12 +30753,4 @@
     <ds:schemaRef ds:uri="http://www.w3.org/2001/XMLSchema"/>
   </ds:schemaRefs>
 </ds:datastoreItem>
-</file>
-
-<file path=customXml/itemProps3.xml><?xml version="1.0" encoding="utf-8"?>
-<ds:datastoreItem xmlns:ds="http://schemas.openxmlformats.org/officeDocument/2006/customXml" ds:itemID="{D2D699D9-1B31-4616-8FB0-B4CEE1C49142}">
-  <ds:schemaRefs>
-    <ds:schemaRef ds:uri="http://schemas.microsoft.com/sharepoint/v3/contenttype/forms"/>
-  </ds:schemaRefs>
-</ds:datastoreItem>
 </file>
</xml_diff>